<commit_message>
Update PowerPoint template with corrected poster dimensions
</commit_message>
<xml_diff>
--- a/powerpoint/poster.pptx
+++ b/powerpoint/poster.pptx
@@ -7,14 +7,14 @@
   <p:sldIdLst>
     <p:sldId id="256" r:id="rId2"/>
   </p:sldIdLst>
-  <p:sldSz cx="43421300" cy="32561213"/>
+  <p:sldSz cx="42456100" cy="31838900"/>
   <p:notesSz cx="7772400" cy="10058400"/>
   <p:defaultTextStyle>
     <a:defPPr>
       <a:defRPr lang="en-US"/>
     </a:defPPr>
-    <a:lvl1pPr marL="0" algn="l" defTabSz="914400" rtl="0" eaLnBrk="1" latinLnBrk="0" hangingPunct="1">
-      <a:defRPr sz="1800" kern="1200">
+    <a:lvl1pPr marL="0" algn="l" defTabSz="894009" rtl="0" eaLnBrk="1" latinLnBrk="0" hangingPunct="1">
+      <a:defRPr sz="1760" kern="1200">
         <a:solidFill>
           <a:schemeClr val="tx1"/>
         </a:solidFill>
@@ -23,8 +23,8 @@
         <a:cs typeface="+mn-cs"/>
       </a:defRPr>
     </a:lvl1pPr>
-    <a:lvl2pPr marL="457200" algn="l" defTabSz="914400" rtl="0" eaLnBrk="1" latinLnBrk="0" hangingPunct="1">
-      <a:defRPr sz="1800" kern="1200">
+    <a:lvl2pPr marL="447004" algn="l" defTabSz="894009" rtl="0" eaLnBrk="1" latinLnBrk="0" hangingPunct="1">
+      <a:defRPr sz="1760" kern="1200">
         <a:solidFill>
           <a:schemeClr val="tx1"/>
         </a:solidFill>
@@ -33,8 +33,8 @@
         <a:cs typeface="+mn-cs"/>
       </a:defRPr>
     </a:lvl2pPr>
-    <a:lvl3pPr marL="914400" algn="l" defTabSz="914400" rtl="0" eaLnBrk="1" latinLnBrk="0" hangingPunct="1">
-      <a:defRPr sz="1800" kern="1200">
+    <a:lvl3pPr marL="894009" algn="l" defTabSz="894009" rtl="0" eaLnBrk="1" latinLnBrk="0" hangingPunct="1">
+      <a:defRPr sz="1760" kern="1200">
         <a:solidFill>
           <a:schemeClr val="tx1"/>
         </a:solidFill>
@@ -43,8 +43,8 @@
         <a:cs typeface="+mn-cs"/>
       </a:defRPr>
     </a:lvl3pPr>
-    <a:lvl4pPr marL="1371600" algn="l" defTabSz="914400" rtl="0" eaLnBrk="1" latinLnBrk="0" hangingPunct="1">
-      <a:defRPr sz="1800" kern="1200">
+    <a:lvl4pPr marL="1341013" algn="l" defTabSz="894009" rtl="0" eaLnBrk="1" latinLnBrk="0" hangingPunct="1">
+      <a:defRPr sz="1760" kern="1200">
         <a:solidFill>
           <a:schemeClr val="tx1"/>
         </a:solidFill>
@@ -53,8 +53,8 @@
         <a:cs typeface="+mn-cs"/>
       </a:defRPr>
     </a:lvl4pPr>
-    <a:lvl5pPr marL="1828800" algn="l" defTabSz="914400" rtl="0" eaLnBrk="1" latinLnBrk="0" hangingPunct="1">
-      <a:defRPr sz="1800" kern="1200">
+    <a:lvl5pPr marL="1788018" algn="l" defTabSz="894009" rtl="0" eaLnBrk="1" latinLnBrk="0" hangingPunct="1">
+      <a:defRPr sz="1760" kern="1200">
         <a:solidFill>
           <a:schemeClr val="tx1"/>
         </a:solidFill>
@@ -63,8 +63,8 @@
         <a:cs typeface="+mn-cs"/>
       </a:defRPr>
     </a:lvl5pPr>
-    <a:lvl6pPr marL="2286000" algn="l" defTabSz="914400" rtl="0" eaLnBrk="1" latinLnBrk="0" hangingPunct="1">
-      <a:defRPr sz="1800" kern="1200">
+    <a:lvl6pPr marL="2235022" algn="l" defTabSz="894009" rtl="0" eaLnBrk="1" latinLnBrk="0" hangingPunct="1">
+      <a:defRPr sz="1760" kern="1200">
         <a:solidFill>
           <a:schemeClr val="tx1"/>
         </a:solidFill>
@@ -73,8 +73,8 @@
         <a:cs typeface="+mn-cs"/>
       </a:defRPr>
     </a:lvl6pPr>
-    <a:lvl7pPr marL="2743200" algn="l" defTabSz="914400" rtl="0" eaLnBrk="1" latinLnBrk="0" hangingPunct="1">
-      <a:defRPr sz="1800" kern="1200">
+    <a:lvl7pPr marL="2682027" algn="l" defTabSz="894009" rtl="0" eaLnBrk="1" latinLnBrk="0" hangingPunct="1">
+      <a:defRPr sz="1760" kern="1200">
         <a:solidFill>
           <a:schemeClr val="tx1"/>
         </a:solidFill>
@@ -83,8 +83,8 @@
         <a:cs typeface="+mn-cs"/>
       </a:defRPr>
     </a:lvl7pPr>
-    <a:lvl8pPr marL="3200400" algn="l" defTabSz="914400" rtl="0" eaLnBrk="1" latinLnBrk="0" hangingPunct="1">
-      <a:defRPr sz="1800" kern="1200">
+    <a:lvl8pPr marL="3129031" algn="l" defTabSz="894009" rtl="0" eaLnBrk="1" latinLnBrk="0" hangingPunct="1">
+      <a:defRPr sz="1760" kern="1200">
         <a:solidFill>
           <a:schemeClr val="tx1"/>
         </a:solidFill>
@@ -93,8 +93,8 @@
         <a:cs typeface="+mn-cs"/>
       </a:defRPr>
     </a:lvl8pPr>
-    <a:lvl9pPr marL="3657600" algn="l" defTabSz="914400" rtl="0" eaLnBrk="1" latinLnBrk="0" hangingPunct="1">
-      <a:defRPr sz="1800" kern="1200">
+    <a:lvl9pPr marL="3576036" algn="l" defTabSz="894009" rtl="0" eaLnBrk="1" latinLnBrk="0" hangingPunct="1">
+      <a:defRPr sz="1760" kern="1200">
         <a:solidFill>
           <a:schemeClr val="tx1"/>
         </a:solidFill>
@@ -107,12 +107,12 @@
   <p:extLst>
     <p:ext uri="{EFAFB233-063F-42B5-8137-9DF3F51BA10A}">
       <p15:sldGuideLst xmlns:p15="http://schemas.microsoft.com/office/powerpoint/2012/main">
-        <p15:guide id="1" orient="horz" pos="3248" userDrawn="1">
+        <p15:guide id="1" orient="horz" pos="3176" userDrawn="1">
           <p15:clr>
             <a:srgbClr val="A4A3A4"/>
           </p15:clr>
         </p15:guide>
-        <p15:guide id="2" pos="404" userDrawn="1">
+        <p15:guide id="2" pos="395" userDrawn="1">
           <p15:clr>
             <a:srgbClr val="A4A3A4"/>
           </p15:clr>
@@ -152,8 +152,8 @@
         </p:nvSpPr>
         <p:spPr>
           <a:xfrm>
-            <a:off x="2170800" y="1284840"/>
-            <a:ext cx="39079080" cy="5376960"/>
+            <a:off x="2122546" y="3587244"/>
+            <a:ext cx="38210402" cy="595869"/>
           </a:xfrm>
           <a:prstGeom prst="rect">
             <a:avLst/>
@@ -167,12 +167,17 @@
           <a:bodyPr lIns="0" tIns="0" rIns="0" bIns="0" anchor="ctr">
             <a:spAutoFit/>
           </a:bodyPr>
-          <a:lstStyle/>
+          <a:lstStyle>
+            <a:lvl1pPr indent="0" algn="ctr">
+              <a:buNone/>
+              <a:defRPr/>
+            </a:lvl1pPr>
+          </a:lstStyle>
           <a:p>
             <a:pPr indent="0" algn="ctr">
               <a:buNone/>
             </a:pPr>
-            <a:endParaRPr lang="en-US" sz="4400" b="0" u="none" strike="noStrike">
+            <a:endParaRPr lang="en-US" sz="4302" b="0" u="none" strike="noStrike">
               <a:solidFill>
                 <a:srgbClr val="000000"/>
               </a:solidFill>
@@ -195,8 +200,8 @@
         </p:nvSpPr>
         <p:spPr>
           <a:xfrm>
-            <a:off x="2170800" y="7535160"/>
-            <a:ext cx="39079080" cy="18676440"/>
+            <a:off x="2122546" y="16282380"/>
+            <a:ext cx="38210402" cy="433388"/>
           </a:xfrm>
           <a:prstGeom prst="rect">
             <a:avLst/>
@@ -210,12 +215,17 @@
           <a:bodyPr lIns="0" tIns="0" rIns="0" bIns="0" anchor="ctr">
             <a:spAutoFit/>
           </a:bodyPr>
-          <a:lstStyle/>
+          <a:lstStyle>
+            <a:lvl1pPr indent="0" algn="ctr">
+              <a:buNone/>
+              <a:defRPr/>
+            </a:lvl1pPr>
+          </a:lstStyle>
           <a:p>
             <a:pPr indent="0" algn="ctr">
               <a:buNone/>
             </a:pPr>
-            <a:endParaRPr lang="en-US" sz="3200" b="0" u="none" strike="noStrike">
+            <a:endParaRPr lang="en-US" sz="3129" b="0" u="none" strike="noStrike">
               <a:solidFill>
                 <a:srgbClr val="000000"/>
               </a:solidFill>
@@ -264,7 +274,7 @@
   </p:sldLayoutIdLst>
   <p:txStyles>
     <p:titleStyle>
-      <a:lvl1pPr algn="l" defTabSz="914400" rtl="0" eaLnBrk="1" latinLnBrk="0" hangingPunct="1">
+      <a:lvl1pPr algn="l" defTabSz="894100" rtl="0" eaLnBrk="1" latinLnBrk="0" hangingPunct="1">
         <a:lnSpc>
           <a:spcPct val="90000"/>
         </a:lnSpc>
@@ -272,7 +282,7 @@
           <a:spcPct val="0"/>
         </a:spcBef>
         <a:buNone/>
-        <a:defRPr sz="4400" kern="1200">
+        <a:defRPr sz="4302" kern="1200">
           <a:solidFill>
             <a:schemeClr val="tx1"/>
           </a:solidFill>
@@ -283,16 +293,16 @@
       </a:lvl1pPr>
     </p:titleStyle>
     <p:bodyStyle>
-      <a:lvl1pPr marL="228600" indent="-228600" algn="l" defTabSz="914400" rtl="0" eaLnBrk="1" latinLnBrk="0" hangingPunct="1">
+      <a:lvl1pPr marL="223525" indent="-223525" algn="l" defTabSz="894100" rtl="0" eaLnBrk="1" latinLnBrk="0" hangingPunct="1">
         <a:lnSpc>
           <a:spcPct val="90000"/>
         </a:lnSpc>
         <a:spcBef>
-          <a:spcPts val="1000"/>
+          <a:spcPts val="978"/>
         </a:spcBef>
         <a:buFont typeface="Arial" panose="020B0604020202020204" pitchFamily="34" charset="0"/>
         <a:buChar char="•"/>
-        <a:defRPr sz="2800" kern="1200">
+        <a:defRPr sz="2738" kern="1200">
           <a:solidFill>
             <a:schemeClr val="tx1"/>
           </a:solidFill>
@@ -301,16 +311,16 @@
           <a:cs typeface="+mn-cs"/>
         </a:defRPr>
       </a:lvl1pPr>
-      <a:lvl2pPr marL="685800" indent="-228600" algn="l" defTabSz="914400" rtl="0" eaLnBrk="1" latinLnBrk="0" hangingPunct="1">
+      <a:lvl2pPr marL="670575" indent="-223525" algn="l" defTabSz="894100" rtl="0" eaLnBrk="1" latinLnBrk="0" hangingPunct="1">
         <a:lnSpc>
           <a:spcPct val="90000"/>
         </a:lnSpc>
         <a:spcBef>
-          <a:spcPts val="500"/>
+          <a:spcPts val="489"/>
         </a:spcBef>
         <a:buFont typeface="Arial" panose="020B0604020202020204" pitchFamily="34" charset="0"/>
         <a:buChar char="•"/>
-        <a:defRPr sz="2400" kern="1200">
+        <a:defRPr sz="2347" kern="1200">
           <a:solidFill>
             <a:schemeClr val="tx1"/>
           </a:solidFill>
@@ -319,16 +329,16 @@
           <a:cs typeface="+mn-cs"/>
         </a:defRPr>
       </a:lvl2pPr>
-      <a:lvl3pPr marL="1143000" indent="-228600" algn="l" defTabSz="914400" rtl="0" eaLnBrk="1" latinLnBrk="0" hangingPunct="1">
+      <a:lvl3pPr marL="1117625" indent="-223525" algn="l" defTabSz="894100" rtl="0" eaLnBrk="1" latinLnBrk="0" hangingPunct="1">
         <a:lnSpc>
           <a:spcPct val="90000"/>
         </a:lnSpc>
         <a:spcBef>
-          <a:spcPts val="500"/>
+          <a:spcPts val="489"/>
         </a:spcBef>
         <a:buFont typeface="Arial" panose="020B0604020202020204" pitchFamily="34" charset="0"/>
         <a:buChar char="•"/>
-        <a:defRPr sz="2000" kern="1200">
+        <a:defRPr sz="1956" kern="1200">
           <a:solidFill>
             <a:schemeClr val="tx1"/>
           </a:solidFill>
@@ -337,16 +347,16 @@
           <a:cs typeface="+mn-cs"/>
         </a:defRPr>
       </a:lvl3pPr>
-      <a:lvl4pPr marL="1600200" indent="-228600" algn="l" defTabSz="914400" rtl="0" eaLnBrk="1" latinLnBrk="0" hangingPunct="1">
+      <a:lvl4pPr marL="1564676" indent="-223525" algn="l" defTabSz="894100" rtl="0" eaLnBrk="1" latinLnBrk="0" hangingPunct="1">
         <a:lnSpc>
           <a:spcPct val="90000"/>
         </a:lnSpc>
         <a:spcBef>
-          <a:spcPts val="500"/>
+          <a:spcPts val="489"/>
         </a:spcBef>
         <a:buFont typeface="Arial" panose="020B0604020202020204" pitchFamily="34" charset="0"/>
         <a:buChar char="•"/>
-        <a:defRPr sz="1800" kern="1200">
+        <a:defRPr sz="1760" kern="1200">
           <a:solidFill>
             <a:schemeClr val="tx1"/>
           </a:solidFill>
@@ -355,16 +365,16 @@
           <a:cs typeface="+mn-cs"/>
         </a:defRPr>
       </a:lvl4pPr>
-      <a:lvl5pPr marL="2057400" indent="-228600" algn="l" defTabSz="914400" rtl="0" eaLnBrk="1" latinLnBrk="0" hangingPunct="1">
+      <a:lvl5pPr marL="2011726" indent="-223525" algn="l" defTabSz="894100" rtl="0" eaLnBrk="1" latinLnBrk="0" hangingPunct="1">
         <a:lnSpc>
           <a:spcPct val="90000"/>
         </a:lnSpc>
         <a:spcBef>
-          <a:spcPts val="500"/>
+          <a:spcPts val="489"/>
         </a:spcBef>
         <a:buFont typeface="Arial" panose="020B0604020202020204" pitchFamily="34" charset="0"/>
         <a:buChar char="•"/>
-        <a:defRPr sz="1800" kern="1200">
+        <a:defRPr sz="1760" kern="1200">
           <a:solidFill>
             <a:schemeClr val="tx1"/>
           </a:solidFill>
@@ -373,16 +383,16 @@
           <a:cs typeface="+mn-cs"/>
         </a:defRPr>
       </a:lvl5pPr>
-      <a:lvl6pPr marL="2514600" indent="-228600" algn="l" defTabSz="914400" rtl="0" eaLnBrk="1" latinLnBrk="0" hangingPunct="1">
+      <a:lvl6pPr marL="2458776" indent="-223525" algn="l" defTabSz="894100" rtl="0" eaLnBrk="1" latinLnBrk="0" hangingPunct="1">
         <a:lnSpc>
           <a:spcPct val="90000"/>
         </a:lnSpc>
         <a:spcBef>
-          <a:spcPts val="500"/>
+          <a:spcPts val="489"/>
         </a:spcBef>
         <a:buFont typeface="Arial" panose="020B0604020202020204" pitchFamily="34" charset="0"/>
         <a:buChar char="•"/>
-        <a:defRPr sz="1800" kern="1200">
+        <a:defRPr sz="1760" kern="1200">
           <a:solidFill>
             <a:schemeClr val="tx1"/>
           </a:solidFill>
@@ -391,16 +401,16 @@
           <a:cs typeface="+mn-cs"/>
         </a:defRPr>
       </a:lvl6pPr>
-      <a:lvl7pPr marL="2971800" indent="-228600" algn="l" defTabSz="914400" rtl="0" eaLnBrk="1" latinLnBrk="0" hangingPunct="1">
+      <a:lvl7pPr marL="2905826" indent="-223525" algn="l" defTabSz="894100" rtl="0" eaLnBrk="1" latinLnBrk="0" hangingPunct="1">
         <a:lnSpc>
           <a:spcPct val="90000"/>
         </a:lnSpc>
         <a:spcBef>
-          <a:spcPts val="500"/>
+          <a:spcPts val="489"/>
         </a:spcBef>
         <a:buFont typeface="Arial" panose="020B0604020202020204" pitchFamily="34" charset="0"/>
         <a:buChar char="•"/>
-        <a:defRPr sz="1800" kern="1200">
+        <a:defRPr sz="1760" kern="1200">
           <a:solidFill>
             <a:schemeClr val="tx1"/>
           </a:solidFill>
@@ -409,16 +419,16 @@
           <a:cs typeface="+mn-cs"/>
         </a:defRPr>
       </a:lvl7pPr>
-      <a:lvl8pPr marL="3429000" indent="-228600" algn="l" defTabSz="914400" rtl="0" eaLnBrk="1" latinLnBrk="0" hangingPunct="1">
+      <a:lvl8pPr marL="3352876" indent="-223525" algn="l" defTabSz="894100" rtl="0" eaLnBrk="1" latinLnBrk="0" hangingPunct="1">
         <a:lnSpc>
           <a:spcPct val="90000"/>
         </a:lnSpc>
         <a:spcBef>
-          <a:spcPts val="500"/>
+          <a:spcPts val="489"/>
         </a:spcBef>
         <a:buFont typeface="Arial" panose="020B0604020202020204" pitchFamily="34" charset="0"/>
         <a:buChar char="•"/>
-        <a:defRPr sz="1800" kern="1200">
+        <a:defRPr sz="1760" kern="1200">
           <a:solidFill>
             <a:schemeClr val="tx1"/>
           </a:solidFill>
@@ -427,16 +437,16 @@
           <a:cs typeface="+mn-cs"/>
         </a:defRPr>
       </a:lvl8pPr>
-      <a:lvl9pPr marL="3886200" indent="-228600" algn="l" defTabSz="914400" rtl="0" eaLnBrk="1" latinLnBrk="0" hangingPunct="1">
+      <a:lvl9pPr marL="3799926" indent="-223525" algn="l" defTabSz="894100" rtl="0" eaLnBrk="1" latinLnBrk="0" hangingPunct="1">
         <a:lnSpc>
           <a:spcPct val="90000"/>
         </a:lnSpc>
         <a:spcBef>
-          <a:spcPts val="500"/>
+          <a:spcPts val="489"/>
         </a:spcBef>
         <a:buFont typeface="Arial" panose="020B0604020202020204" pitchFamily="34" charset="0"/>
         <a:buChar char="•"/>
-        <a:defRPr sz="1800" kern="1200">
+        <a:defRPr sz="1760" kern="1200">
           <a:solidFill>
             <a:schemeClr val="tx1"/>
           </a:solidFill>
@@ -450,8 +460,8 @@
       <a:defPPr>
         <a:defRPr lang="en-US"/>
       </a:defPPr>
-      <a:lvl1pPr marL="0" algn="l" defTabSz="914400" rtl="0" eaLnBrk="1" latinLnBrk="0" hangingPunct="1">
-        <a:defRPr sz="1800" kern="1200">
+      <a:lvl1pPr marL="0" algn="l" defTabSz="894100" rtl="0" eaLnBrk="1" latinLnBrk="0" hangingPunct="1">
+        <a:defRPr sz="1760" kern="1200">
           <a:solidFill>
             <a:schemeClr val="tx1"/>
           </a:solidFill>
@@ -460,8 +470,8 @@
           <a:cs typeface="+mn-cs"/>
         </a:defRPr>
       </a:lvl1pPr>
-      <a:lvl2pPr marL="457200" algn="l" defTabSz="914400" rtl="0" eaLnBrk="1" latinLnBrk="0" hangingPunct="1">
-        <a:defRPr sz="1800" kern="1200">
+      <a:lvl2pPr marL="447050" algn="l" defTabSz="894100" rtl="0" eaLnBrk="1" latinLnBrk="0" hangingPunct="1">
+        <a:defRPr sz="1760" kern="1200">
           <a:solidFill>
             <a:schemeClr val="tx1"/>
           </a:solidFill>
@@ -470,8 +480,8 @@
           <a:cs typeface="+mn-cs"/>
         </a:defRPr>
       </a:lvl2pPr>
-      <a:lvl3pPr marL="914400" algn="l" defTabSz="914400" rtl="0" eaLnBrk="1" latinLnBrk="0" hangingPunct="1">
-        <a:defRPr sz="1800" kern="1200">
+      <a:lvl3pPr marL="894100" algn="l" defTabSz="894100" rtl="0" eaLnBrk="1" latinLnBrk="0" hangingPunct="1">
+        <a:defRPr sz="1760" kern="1200">
           <a:solidFill>
             <a:schemeClr val="tx1"/>
           </a:solidFill>
@@ -480,8 +490,8 @@
           <a:cs typeface="+mn-cs"/>
         </a:defRPr>
       </a:lvl3pPr>
-      <a:lvl4pPr marL="1371600" algn="l" defTabSz="914400" rtl="0" eaLnBrk="1" latinLnBrk="0" hangingPunct="1">
-        <a:defRPr sz="1800" kern="1200">
+      <a:lvl4pPr marL="1341150" algn="l" defTabSz="894100" rtl="0" eaLnBrk="1" latinLnBrk="0" hangingPunct="1">
+        <a:defRPr sz="1760" kern="1200">
           <a:solidFill>
             <a:schemeClr val="tx1"/>
           </a:solidFill>
@@ -490,8 +500,8 @@
           <a:cs typeface="+mn-cs"/>
         </a:defRPr>
       </a:lvl4pPr>
-      <a:lvl5pPr marL="1828800" algn="l" defTabSz="914400" rtl="0" eaLnBrk="1" latinLnBrk="0" hangingPunct="1">
-        <a:defRPr sz="1800" kern="1200">
+      <a:lvl5pPr marL="1788201" algn="l" defTabSz="894100" rtl="0" eaLnBrk="1" latinLnBrk="0" hangingPunct="1">
+        <a:defRPr sz="1760" kern="1200">
           <a:solidFill>
             <a:schemeClr val="tx1"/>
           </a:solidFill>
@@ -500,8 +510,8 @@
           <a:cs typeface="+mn-cs"/>
         </a:defRPr>
       </a:lvl5pPr>
-      <a:lvl6pPr marL="2286000" algn="l" defTabSz="914400" rtl="0" eaLnBrk="1" latinLnBrk="0" hangingPunct="1">
-        <a:defRPr sz="1800" kern="1200">
+      <a:lvl6pPr marL="2235251" algn="l" defTabSz="894100" rtl="0" eaLnBrk="1" latinLnBrk="0" hangingPunct="1">
+        <a:defRPr sz="1760" kern="1200">
           <a:solidFill>
             <a:schemeClr val="tx1"/>
           </a:solidFill>
@@ -510,8 +520,8 @@
           <a:cs typeface="+mn-cs"/>
         </a:defRPr>
       </a:lvl6pPr>
-      <a:lvl7pPr marL="2743200" algn="l" defTabSz="914400" rtl="0" eaLnBrk="1" latinLnBrk="0" hangingPunct="1">
-        <a:defRPr sz="1800" kern="1200">
+      <a:lvl7pPr marL="2682301" algn="l" defTabSz="894100" rtl="0" eaLnBrk="1" latinLnBrk="0" hangingPunct="1">
+        <a:defRPr sz="1760" kern="1200">
           <a:solidFill>
             <a:schemeClr val="tx1"/>
           </a:solidFill>
@@ -520,8 +530,8 @@
           <a:cs typeface="+mn-cs"/>
         </a:defRPr>
       </a:lvl7pPr>
-      <a:lvl8pPr marL="3200400" algn="l" defTabSz="914400" rtl="0" eaLnBrk="1" latinLnBrk="0" hangingPunct="1">
-        <a:defRPr sz="1800" kern="1200">
+      <a:lvl8pPr marL="3129351" algn="l" defTabSz="894100" rtl="0" eaLnBrk="1" latinLnBrk="0" hangingPunct="1">
+        <a:defRPr sz="1760" kern="1200">
           <a:solidFill>
             <a:schemeClr val="tx1"/>
           </a:solidFill>
@@ -530,8 +540,8 @@
           <a:cs typeface="+mn-cs"/>
         </a:defRPr>
       </a:lvl8pPr>
-      <a:lvl9pPr marL="3657600" algn="l" defTabSz="914400" rtl="0" eaLnBrk="1" latinLnBrk="0" hangingPunct="1">
-        <a:defRPr sz="1800" kern="1200">
+      <a:lvl9pPr marL="3576401" algn="l" defTabSz="894100" rtl="0" eaLnBrk="1" latinLnBrk="0" hangingPunct="1">
+        <a:defRPr sz="1760" kern="1200">
           <a:solidFill>
             <a:schemeClr val="tx1"/>
           </a:solidFill>
@@ -570,8 +580,8 @@
         </p:nvSpPr>
         <p:spPr>
           <a:xfrm>
-            <a:off x="0" y="0"/>
-            <a:ext cx="43415280" cy="32562000"/>
+            <a:off x="0" y="741"/>
+            <a:ext cx="42450214" cy="31838188"/>
           </a:xfrm>
           <a:custGeom>
             <a:avLst/>
@@ -613,12 +623,10 @@
           </a:bodyPr>
           <a:lstStyle/>
           <a:p>
-            <a:endParaRPr lang="en-US" sz="2400" b="0" u="none" strike="noStrike">
+            <a:endParaRPr lang="en-US" sz="2347">
               <a:solidFill>
                 <a:srgbClr val="000000"/>
               </a:solidFill>
-              <a:effectLst/>
-              <a:uFillTx/>
               <a:latin typeface="Times New Roman"/>
             </a:endParaRPr>
           </a:p>
@@ -632,8 +640,8 @@
         </p:nvSpPr>
         <p:spPr>
           <a:xfrm>
-            <a:off x="0" y="0"/>
-            <a:ext cx="43415280" cy="32562000"/>
+            <a:off x="0" y="741"/>
+            <a:ext cx="42450214" cy="31838188"/>
           </a:xfrm>
           <a:custGeom>
             <a:avLst/>
@@ -675,12 +683,10 @@
           </a:bodyPr>
           <a:lstStyle/>
           <a:p>
-            <a:endParaRPr lang="en-US" sz="2400" b="0" u="none" strike="noStrike">
+            <a:endParaRPr lang="en-US" sz="2347">
               <a:solidFill>
                 <a:srgbClr val="000000"/>
               </a:solidFill>
-              <a:effectLst/>
-              <a:uFillTx/>
               <a:latin typeface="Times New Roman"/>
             </a:endParaRPr>
           </a:p>
@@ -696,8 +702,8 @@
         </p:nvSpPr>
         <p:spPr>
           <a:xfrm>
-            <a:off x="0" y="0"/>
-            <a:ext cx="43415280" cy="32562000"/>
+            <a:off x="0" y="741"/>
+            <a:ext cx="42450214" cy="31838188"/>
           </a:xfrm>
           <a:custGeom>
             <a:avLst/>
@@ -739,12 +745,10 @@
           </a:bodyPr>
           <a:lstStyle/>
           <a:p>
-            <a:endParaRPr lang="en-US" sz="2400" b="0" u="none" strike="noStrike">
+            <a:endParaRPr lang="en-US" sz="2347">
               <a:solidFill>
                 <a:srgbClr val="000000"/>
               </a:solidFill>
-              <a:effectLst/>
-              <a:uFillTx/>
               <a:latin typeface="Times New Roman"/>
             </a:endParaRPr>
           </a:p>
@@ -766,8 +770,8 @@
         </p:nvGrpSpPr>
         <p:grpSpPr>
           <a:xfrm>
-            <a:off x="14925600" y="4375080"/>
-            <a:ext cx="13563720" cy="797040"/>
+            <a:off x="14593823" y="4278569"/>
+            <a:ext cx="13262216" cy="779323"/>
             <a:chOff x="14925600" y="4375080"/>
             <a:chExt cx="13563720" cy="797040"/>
           </a:xfrm>
@@ -825,12 +829,10 @@
             </a:bodyPr>
             <a:lstStyle/>
             <a:p>
-              <a:endParaRPr lang="en-US" sz="2400" b="0" u="none" strike="noStrike">
+              <a:endParaRPr lang="en-US" sz="2347">
                 <a:solidFill>
                   <a:srgbClr val="000000"/>
                 </a:solidFill>
-                <a:effectLst/>
-                <a:uFillTx/>
                 <a:latin typeface="Times New Roman"/>
               </a:endParaRPr>
             </a:p>
@@ -847,7 +849,7 @@
           <p:spPr>
             <a:xfrm>
               <a:off x="20492280" y="4375080"/>
-              <a:ext cx="2430720" cy="596160"/>
+              <a:ext cx="2454251" cy="646402"/>
             </a:xfrm>
             <a:prstGeom prst="rect">
               <a:avLst/>
@@ -864,23 +866,19 @@
             <a:lstStyle/>
             <a:p>
               <a:r>
-                <a:rPr lang="en-US" sz="4200" b="1" u="none" strike="noStrike" dirty="0">
+                <a:rPr lang="en-US" sz="4107" b="1" dirty="0">
                   <a:solidFill>
                     <a:srgbClr val="000000"/>
                   </a:solidFill>
-                  <a:effectLst/>
-                  <a:uFillTx/>
                   <a:latin typeface="Arial"/>
                   <a:ea typeface="Arial"/>
                 </a:rPr>
                 <a:t>Column 2</a:t>
               </a:r>
-              <a:endParaRPr lang="en-US" sz="4200" b="0" u="none" strike="noStrike" dirty="0">
+              <a:endParaRPr lang="en-US" sz="4107" dirty="0">
                 <a:solidFill>
                   <a:srgbClr val="000000"/>
                 </a:solidFill>
-                <a:effectLst/>
-                <a:uFillTx/>
                 <a:latin typeface="Times New Roman"/>
               </a:endParaRPr>
             </a:p>
@@ -903,8 +901,8 @@
         </p:nvGrpSpPr>
         <p:grpSpPr>
           <a:xfrm>
-            <a:off x="29174760" y="4375080"/>
-            <a:ext cx="13554720" cy="797040"/>
+            <a:off x="28526242" y="4278569"/>
+            <a:ext cx="13253416" cy="779323"/>
             <a:chOff x="29174760" y="4375080"/>
             <a:chExt cx="13554720" cy="797040"/>
           </a:xfrm>
@@ -962,12 +960,10 @@
             </a:bodyPr>
             <a:lstStyle/>
             <a:p>
-              <a:endParaRPr lang="en-US" sz="2400" b="0" u="none" strike="noStrike">
+              <a:endParaRPr lang="en-US" sz="2347">
                 <a:solidFill>
                   <a:srgbClr val="000000"/>
                 </a:solidFill>
-                <a:effectLst/>
-                <a:uFillTx/>
                 <a:latin typeface="Times New Roman"/>
               </a:endParaRPr>
             </a:p>
@@ -984,7 +980,7 @@
           <p:spPr>
             <a:xfrm>
               <a:off x="34735320" y="4375080"/>
-              <a:ext cx="2430720" cy="596160"/>
+              <a:ext cx="2454251" cy="646402"/>
             </a:xfrm>
             <a:prstGeom prst="rect">
               <a:avLst/>
@@ -1001,23 +997,19 @@
             <a:lstStyle/>
             <a:p>
               <a:r>
-                <a:rPr lang="en-US" sz="4200" b="1" u="none" strike="noStrike" dirty="0">
+                <a:rPr lang="en-US" sz="4107" b="1" dirty="0">
                   <a:solidFill>
                     <a:srgbClr val="000000"/>
                   </a:solidFill>
-                  <a:effectLst/>
-                  <a:uFillTx/>
                   <a:latin typeface="Arial"/>
                   <a:ea typeface="Arial"/>
                 </a:rPr>
                 <a:t>Column 3</a:t>
               </a:r>
-              <a:endParaRPr lang="en-US" sz="4200" b="0" u="none" strike="noStrike" dirty="0">
+              <a:endParaRPr lang="en-US" sz="4107" dirty="0">
                 <a:solidFill>
                   <a:srgbClr val="000000"/>
                 </a:solidFill>
-                <a:effectLst/>
-                <a:uFillTx/>
                 <a:latin typeface="Times New Roman"/>
               </a:endParaRPr>
             </a:p>
@@ -1038,10 +1030,10 @@
         </p:nvGrpSpPr>
         <p:grpSpPr>
           <a:xfrm>
-            <a:off x="29174760" y="5756040"/>
-            <a:ext cx="13554720" cy="1275120"/>
+            <a:off x="28526242" y="5628831"/>
+            <a:ext cx="13253416" cy="1266996"/>
             <a:chOff x="29174760" y="5756040"/>
-            <a:chExt cx="13554720" cy="1275120"/>
+            <a:chExt cx="13554720" cy="1295800"/>
           </a:xfrm>
         </p:grpSpPr>
         <p:sp>
@@ -1095,12 +1087,10 @@
             </a:bodyPr>
             <a:lstStyle/>
             <a:p>
-              <a:endParaRPr lang="en-US" sz="2400" b="0" u="none" strike="noStrike">
+              <a:endParaRPr lang="en-US" sz="2347">
                 <a:solidFill>
                   <a:srgbClr val="000000"/>
                 </a:solidFill>
-                <a:effectLst/>
-                <a:uFillTx/>
                 <a:latin typeface="Times New Roman"/>
               </a:endParaRPr>
             </a:p>
@@ -1115,7 +1105,7 @@
           <p:spPr>
             <a:xfrm>
               <a:off x="34512480" y="5756040"/>
-              <a:ext cx="2876760" cy="596160"/>
+              <a:ext cx="2906738" cy="646402"/>
             </a:xfrm>
             <a:prstGeom prst="rect">
               <a:avLst/>
@@ -1132,23 +1122,19 @@
             <a:lstStyle/>
             <a:p>
               <a:r>
-                <a:rPr lang="en-US" sz="4200" b="1" u="none" strike="noStrike" dirty="0">
+                <a:rPr lang="en-US" sz="4107" b="1" dirty="0">
                   <a:solidFill>
                     <a:srgbClr val="000000"/>
                   </a:solidFill>
-                  <a:effectLst/>
-                  <a:uFillTx/>
                   <a:latin typeface="Arial"/>
                   <a:ea typeface="Arial"/>
                 </a:rPr>
                 <a:t>References</a:t>
               </a:r>
-              <a:endParaRPr lang="en-US" sz="4200" b="0" u="none" strike="noStrike" dirty="0">
+              <a:endParaRPr lang="en-US" sz="4107" dirty="0">
                 <a:solidFill>
                   <a:srgbClr val="000000"/>
                 </a:solidFill>
-                <a:effectLst/>
-                <a:uFillTx/>
                 <a:latin typeface="Times New Roman"/>
               </a:endParaRPr>
             </a:p>
@@ -1163,7 +1149,7 @@
           <p:spPr>
             <a:xfrm>
               <a:off x="29283120" y="6774840"/>
-              <a:ext cx="6045840" cy="256320"/>
+              <a:ext cx="6027783" cy="277000"/>
             </a:xfrm>
             <a:prstGeom prst="rect">
               <a:avLst/>
@@ -1180,59 +1166,49 @@
             <a:lstStyle/>
             <a:p>
               <a:r>
-                <a:rPr lang="en-US" sz="1800" b="0" u="none" strike="noStrike" dirty="0">
+                <a:rPr lang="en-US" dirty="0">
                   <a:solidFill>
                     <a:srgbClr val="565A5C"/>
                   </a:solidFill>
-                  <a:effectLst/>
-                  <a:uFillTx/>
                   <a:latin typeface="Arial"/>
                   <a:ea typeface="Arial"/>
                 </a:rPr>
                 <a:t>1. Author, A. "Title of Article." </a:t>
               </a:r>
               <a:r>
-                <a:rPr lang="en-US" sz="1800" b="0" i="1" u="none" strike="noStrike" dirty="0">
+                <a:rPr lang="en-US" i="1" dirty="0">
                   <a:solidFill>
                     <a:srgbClr val="565A5C"/>
                   </a:solidFill>
-                  <a:effectLst/>
-                  <a:uFillTx/>
                   <a:latin typeface="Arial"/>
                   <a:ea typeface="Arial"/>
                 </a:rPr>
                 <a:t>Journal Name </a:t>
               </a:r>
               <a:r>
-                <a:rPr lang="en-US" sz="1800" b="1" u="none" strike="noStrike" dirty="0">
+                <a:rPr lang="en-US" b="1" dirty="0">
                   <a:solidFill>
                     <a:srgbClr val="565A5C"/>
                   </a:solidFill>
-                  <a:effectLst/>
-                  <a:uFillTx/>
                   <a:latin typeface="Arial"/>
                   <a:ea typeface="Arial"/>
                 </a:rPr>
                 <a:t>1</a:t>
               </a:r>
               <a:r>
-                <a:rPr lang="en-US" sz="1800" b="0" u="none" strike="noStrike" dirty="0">
+                <a:rPr lang="en-US" dirty="0">
                   <a:solidFill>
                     <a:srgbClr val="565A5C"/>
                   </a:solidFill>
-                  <a:effectLst/>
-                  <a:uFillTx/>
                   <a:latin typeface="Arial"/>
                   <a:ea typeface="Arial"/>
                 </a:rPr>
                 <a:t>, 1–10 (2025).</a:t>
               </a:r>
-              <a:endParaRPr lang="en-US" sz="1800" b="0" u="none" strike="noStrike" dirty="0">
+              <a:endParaRPr lang="en-US" dirty="0">
                 <a:solidFill>
                   <a:srgbClr val="000000"/>
                 </a:solidFill>
-                <a:effectLst/>
-                <a:uFillTx/>
                 <a:latin typeface="Times New Roman"/>
               </a:endParaRPr>
             </a:p>
@@ -1253,10 +1229,10 @@
         </p:nvGrpSpPr>
         <p:grpSpPr>
           <a:xfrm>
-            <a:off x="29171880" y="7724520"/>
-            <a:ext cx="13557600" cy="579600"/>
+            <a:off x="28523426" y="7553550"/>
+            <a:ext cx="13256232" cy="588695"/>
             <a:chOff x="29171880" y="7724520"/>
-            <a:chExt cx="13557600" cy="579600"/>
+            <a:chExt cx="13557600" cy="602079"/>
           </a:xfrm>
         </p:grpSpPr>
         <p:sp>
@@ -1310,12 +1286,10 @@
             </a:bodyPr>
             <a:lstStyle/>
             <a:p>
-              <a:endParaRPr lang="en-US" sz="2400" b="0" u="none" strike="noStrike">
+              <a:endParaRPr lang="en-US" sz="2347">
                 <a:solidFill>
                   <a:srgbClr val="000000"/>
                 </a:solidFill>
-                <a:effectLst/>
-                <a:uFillTx/>
                 <a:latin typeface="Times New Roman"/>
               </a:endParaRPr>
             </a:p>
@@ -1330,7 +1304,7 @@
           <p:spPr>
             <a:xfrm>
               <a:off x="29171880" y="8015760"/>
-              <a:ext cx="5911920" cy="288360"/>
+              <a:ext cx="5956107" cy="310839"/>
             </a:xfrm>
             <a:prstGeom prst="rect">
               <a:avLst/>
@@ -1347,35 +1321,29 @@
             <a:lstStyle/>
             <a:p>
               <a:r>
-                <a:rPr lang="en-US" sz="2020" b="1" u="none" strike="noStrike" dirty="0">
+                <a:rPr lang="en-US" sz="1975" b="1" dirty="0">
                   <a:solidFill>
                     <a:srgbClr val="565A5C"/>
                   </a:solidFill>
-                  <a:effectLst/>
-                  <a:uFillTx/>
                   <a:latin typeface="Arial"/>
                   <a:ea typeface="Arial"/>
                 </a:rPr>
                 <a:t>Acknowledgments: </a:t>
               </a:r>
               <a:r>
-                <a:rPr lang="en-US" sz="2020" b="0" u="none" strike="noStrike" dirty="0">
+                <a:rPr lang="en-US" sz="1975" dirty="0">
                   <a:solidFill>
                     <a:srgbClr val="565A5C"/>
                   </a:solidFill>
-                  <a:effectLst/>
-                  <a:uFillTx/>
                   <a:latin typeface="Arial"/>
                   <a:ea typeface="Arial"/>
                 </a:rPr>
                 <a:t>This work was supported by ...</a:t>
               </a:r>
-              <a:endParaRPr lang="en-US" sz="2020" b="0" u="none" strike="noStrike" dirty="0">
+              <a:endParaRPr lang="en-US" sz="1975" dirty="0">
                 <a:solidFill>
                   <a:srgbClr val="000000"/>
                 </a:solidFill>
-                <a:effectLst/>
-                <a:uFillTx/>
                 <a:latin typeface="Times New Roman"/>
               </a:endParaRPr>
             </a:p>
@@ -1398,8 +1366,8 @@
         </p:nvGrpSpPr>
         <p:grpSpPr>
           <a:xfrm>
-            <a:off x="0" y="0"/>
-            <a:ext cx="43415280" cy="3657600"/>
+            <a:off x="0" y="741"/>
+            <a:ext cx="42450214" cy="3576296"/>
             <a:chOff x="0" y="0"/>
             <a:chExt cx="43415280" cy="3657600"/>
           </a:xfrm>
@@ -1457,12 +1425,10 @@
             </a:bodyPr>
             <a:lstStyle/>
             <a:p>
-              <a:endParaRPr lang="en-US" sz="2400" b="0" u="none" strike="noStrike" dirty="0">
+              <a:endParaRPr lang="en-US" sz="2347" dirty="0">
                 <a:solidFill>
                   <a:srgbClr val="FFFFFF"/>
                 </a:solidFill>
-                <a:effectLst/>
-                <a:uFillTx/>
                 <a:latin typeface="Times New Roman"/>
               </a:endParaRPr>
             </a:p>
@@ -1521,12 +1487,10 @@
             </a:bodyPr>
             <a:lstStyle/>
             <a:p>
-              <a:endParaRPr lang="en-US" sz="2400" b="0" u="none" strike="noStrike">
+              <a:endParaRPr lang="en-US" sz="2347">
                 <a:solidFill>
                   <a:srgbClr val="000000"/>
                 </a:solidFill>
-                <a:effectLst/>
-                <a:uFillTx/>
                 <a:latin typeface="Times New Roman"/>
               </a:endParaRPr>
             </a:p>
@@ -1587,23 +1551,19 @@
             <a:p>
               <a:pPr algn="ctr"/>
               <a:r>
-                <a:rPr lang="en-US" sz="7200" b="1" u="none" strike="noStrike" dirty="0">
+                <a:rPr lang="en-US" sz="7040" b="1" dirty="0">
                   <a:solidFill>
                     <a:srgbClr val="FFFFFF"/>
                   </a:solidFill>
-                  <a:effectLst/>
-                  <a:uFillTx/>
                   <a:latin typeface="Arial"/>
                   <a:ea typeface="Arial"/>
                 </a:rPr>
                 <a:t>Your Poster Title Goes Here</a:t>
               </a:r>
-              <a:endParaRPr lang="en-US" sz="7200" b="0" u="none" strike="noStrike" dirty="0">
+              <a:endParaRPr lang="en-US" sz="7040" dirty="0">
                 <a:solidFill>
                   <a:srgbClr val="000000"/>
                 </a:solidFill>
-                <a:effectLst/>
-                <a:uFillTx/>
                 <a:latin typeface="Times New Roman"/>
               </a:endParaRPr>
             </a:p>
@@ -1638,71 +1598,59 @@
             <a:p>
               <a:pPr algn="ctr"/>
               <a:r>
-                <a:rPr lang="en-US" sz="3600" b="0" u="none" strike="noStrike" dirty="0">
+                <a:rPr lang="en-US" sz="3520" dirty="0">
                   <a:solidFill>
                     <a:srgbClr val="A2A4A3"/>
                   </a:solidFill>
-                  <a:effectLst/>
-                  <a:uFillTx/>
                   <a:latin typeface="Arial"/>
                   <a:ea typeface="Arial"/>
                 </a:rPr>
                 <a:t>Author One</a:t>
               </a:r>
               <a:r>
-                <a:rPr lang="en-US" sz="3600" b="0" u="none" strike="noStrike" baseline="30000" dirty="0">
+                <a:rPr lang="en-US" sz="3520" baseline="30000" dirty="0">
                   <a:solidFill>
                     <a:srgbClr val="A2A4A3"/>
                   </a:solidFill>
-                  <a:effectLst/>
-                  <a:uFillTx/>
                   <a:latin typeface="Arial"/>
                   <a:ea typeface="Arial"/>
                 </a:rPr>
                 <a:t>1</a:t>
               </a:r>
               <a:r>
-                <a:rPr lang="en-US" sz="3600" b="0" u="none" strike="noStrike" dirty="0">
+                <a:rPr lang="en-US" sz="3520" dirty="0">
                   <a:solidFill>
                     <a:srgbClr val="A2A4A3"/>
                   </a:solidFill>
-                  <a:effectLst/>
-                  <a:uFillTx/>
                   <a:latin typeface="Arial"/>
                   <a:ea typeface="Arial"/>
                 </a:rPr>
                 <a:t> , Author Two</a:t>
               </a:r>
               <a:r>
-                <a:rPr lang="en-US" sz="3600" b="0" u="none" strike="noStrike" baseline="30000" dirty="0">
+                <a:rPr lang="en-US" sz="3520" baseline="30000" dirty="0">
                   <a:solidFill>
                     <a:srgbClr val="A2A4A3"/>
                   </a:solidFill>
-                  <a:effectLst/>
-                  <a:uFillTx/>
                   <a:latin typeface="Arial"/>
                   <a:ea typeface="Arial"/>
                 </a:rPr>
                 <a:t>1,2</a:t>
               </a:r>
               <a:r>
-                <a:rPr lang="en-US" sz="3600" b="0" u="none" strike="noStrike" dirty="0">
+                <a:rPr lang="en-US" sz="3520" dirty="0">
                   <a:solidFill>
                     <a:srgbClr val="A2A4A3"/>
                   </a:solidFill>
-                  <a:effectLst/>
-                  <a:uFillTx/>
                   <a:latin typeface="Arial"/>
                   <a:ea typeface="Arial"/>
                 </a:rPr>
                 <a:t> </a:t>
               </a:r>
-              <a:endParaRPr lang="en-US" sz="3600" b="0" u="none" strike="noStrike" dirty="0">
+              <a:endParaRPr lang="en-US" sz="3520" dirty="0">
                 <a:solidFill>
                   <a:srgbClr val="000000"/>
                 </a:solidFill>
-                <a:effectLst/>
-                <a:uFillTx/>
                 <a:latin typeface="Times New Roman"/>
               </a:endParaRPr>
             </a:p>
@@ -1735,12 +1683,10 @@
             </a:bodyPr>
             <a:lstStyle/>
             <a:p>
-              <a:endParaRPr lang="en-US" sz="3600" b="0" u="none" strike="noStrike" dirty="0">
+              <a:endParaRPr lang="en-US" sz="3520" dirty="0">
                 <a:solidFill>
                   <a:srgbClr val="000000"/>
                 </a:solidFill>
-                <a:effectLst/>
-                <a:uFillTx/>
                 <a:latin typeface="Times New Roman"/>
               </a:endParaRPr>
             </a:p>
@@ -1775,31 +1721,27 @@
             <a:p>
               <a:pPr algn="ctr"/>
               <a:r>
-                <a:rPr lang="en-US" sz="2780" b="0" u="none" strike="noStrike" baseline="30000" dirty="0">
+                <a:rPr lang="en-US" sz="2718" baseline="30000" dirty="0">
                   <a:solidFill>
                     <a:srgbClr val="A2A4A3"/>
                   </a:solidFill>
-                  <a:effectLst/>
-                  <a:uFillTx/>
                   <a:latin typeface="Arial"/>
                   <a:ea typeface="Arial"/>
                 </a:rPr>
                 <a:t>1</a:t>
               </a:r>
               <a:r>
-                <a:rPr lang="en-US" sz="2780" b="0" u="none" strike="noStrike" dirty="0">
+                <a:rPr lang="en-US" sz="2718" dirty="0">
                   <a:solidFill>
                     <a:srgbClr val="A2A4A3"/>
                   </a:solidFill>
-                  <a:effectLst/>
-                  <a:uFillTx/>
                   <a:latin typeface="Arial"/>
                   <a:ea typeface="Arial"/>
                 </a:rPr>
                 <a:t>Department of Physics, University of Colorado Boulder</a:t>
               </a:r>
               <a:r>
-                <a:rPr lang="en-US" sz="2780" dirty="0">
+                <a:rPr lang="en-US" sz="2718" dirty="0">
                   <a:solidFill>
                     <a:srgbClr val="A2A4A3"/>
                   </a:solidFill>
@@ -1808,7 +1750,7 @@
                 <a:t>	</a:t>
               </a:r>
               <a:r>
-                <a:rPr lang="en-US" sz="2780" baseline="30000" dirty="0">
+                <a:rPr lang="en-US" sz="2718" baseline="30000" dirty="0">
                   <a:solidFill>
                     <a:srgbClr val="A2A4A3"/>
                   </a:solidFill>
@@ -1817,7 +1759,7 @@
                 <a:t>2</a:t>
               </a:r>
               <a:r>
-                <a:rPr lang="en-US" sz="2780" dirty="0">
+                <a:rPr lang="en-US" sz="2718" dirty="0">
                   <a:solidFill>
                     <a:srgbClr val="A2A4A3"/>
                   </a:solidFill>
@@ -1825,7 +1767,7 @@
                 </a:rPr>
                 <a:t>JILA, University of Colorado Boulder</a:t>
               </a:r>
-              <a:endParaRPr lang="en-US" sz="2780" dirty="0">
+              <a:endParaRPr lang="en-US" sz="2718" dirty="0">
                 <a:solidFill>
                   <a:srgbClr val="000000"/>
                 </a:solidFill>
@@ -1887,12 +1829,10 @@
             </a:bodyPr>
             <a:lstStyle/>
             <a:p>
-              <a:endParaRPr lang="en-US" sz="2780" b="0" u="none" strike="noStrike" dirty="0">
+              <a:endParaRPr lang="en-US" sz="2718" dirty="0">
                 <a:solidFill>
                   <a:srgbClr val="000000"/>
                 </a:solidFill>
-                <a:effectLst/>
-                <a:uFillTx/>
                 <a:latin typeface="Times New Roman"/>
               </a:endParaRPr>
             </a:p>
@@ -1925,12 +1865,10 @@
             </a:bodyPr>
             <a:lstStyle/>
             <a:p>
-              <a:endParaRPr lang="en-US" sz="2700" b="0" u="none" strike="noStrike" dirty="0">
+              <a:endParaRPr lang="en-US" sz="2640" dirty="0">
                 <a:solidFill>
                   <a:srgbClr val="000000"/>
                 </a:solidFill>
-                <a:effectLst/>
-                <a:uFillTx/>
                 <a:latin typeface="Times New Roman"/>
               </a:endParaRPr>
             </a:p>
@@ -1963,12 +1901,10 @@
             </a:bodyPr>
             <a:lstStyle/>
             <a:p>
-              <a:endParaRPr lang="en-US" sz="2700" b="0" u="none" strike="noStrike" dirty="0">
+              <a:endParaRPr lang="en-US" sz="2640" dirty="0">
                 <a:solidFill>
                   <a:srgbClr val="000000"/>
                 </a:solidFill>
-                <a:effectLst/>
-                <a:uFillTx/>
                 <a:latin typeface="Times New Roman"/>
               </a:endParaRPr>
             </a:p>
@@ -2001,12 +1937,10 @@
             </a:bodyPr>
             <a:lstStyle/>
             <a:p>
-              <a:endParaRPr lang="en-US" sz="2700" b="0" u="none" strike="noStrike" dirty="0">
+              <a:endParaRPr lang="en-US" sz="2640" dirty="0">
                 <a:solidFill>
                   <a:srgbClr val="000000"/>
                 </a:solidFill>
-                <a:effectLst/>
-                <a:uFillTx/>
                 <a:latin typeface="Times New Roman"/>
               </a:endParaRPr>
             </a:p>
@@ -2039,12 +1973,10 @@
             </a:bodyPr>
             <a:lstStyle/>
             <a:p>
-              <a:endParaRPr lang="en-US" sz="2080" b="0" u="none" strike="noStrike" dirty="0">
+              <a:endParaRPr lang="en-US" sz="2034" dirty="0">
                 <a:solidFill>
                   <a:srgbClr val="000000"/>
                 </a:solidFill>
-                <a:effectLst/>
-                <a:uFillTx/>
                 <a:latin typeface="Times New Roman"/>
               </a:endParaRPr>
             </a:p>
@@ -2067,8 +1999,8 @@
         </p:nvGrpSpPr>
         <p:grpSpPr>
           <a:xfrm>
-            <a:off x="0" y="31651560"/>
-            <a:ext cx="43415280" cy="910440"/>
+            <a:off x="0" y="30948727"/>
+            <a:ext cx="42450214" cy="890202"/>
             <a:chOff x="0" y="31651560"/>
             <a:chExt cx="43415280" cy="910440"/>
           </a:xfrm>
@@ -2126,12 +2058,10 @@
             </a:bodyPr>
             <a:lstStyle/>
             <a:p>
-              <a:endParaRPr lang="en-US" sz="2400" b="0" u="none" strike="noStrike">
+              <a:endParaRPr lang="en-US" sz="2347">
                 <a:solidFill>
                   <a:srgbClr val="FFFFFF"/>
                 </a:solidFill>
-                <a:effectLst/>
-                <a:uFillTx/>
                 <a:latin typeface="Times New Roman"/>
               </a:endParaRPr>
             </a:p>
@@ -2190,12 +2120,10 @@
             </a:bodyPr>
             <a:lstStyle/>
             <a:p>
-              <a:endParaRPr lang="en-US" sz="2400" b="0" u="none" strike="noStrike">
+              <a:endParaRPr lang="en-US" sz="2347">
                 <a:solidFill>
                   <a:srgbClr val="000000"/>
                 </a:solidFill>
-                <a:effectLst/>
-                <a:uFillTx/>
                 <a:latin typeface="Times New Roman"/>
               </a:endParaRPr>
             </a:p>
@@ -2229,23 +2157,19 @@
             <a:lstStyle/>
             <a:p>
               <a:r>
-                <a:rPr lang="en-US" sz="2100" b="0" u="none" strike="noStrike" dirty="0">
+                <a:rPr lang="en-US" sz="2053" dirty="0">
                   <a:solidFill>
                     <a:srgbClr val="A2A4A3"/>
                   </a:solidFill>
-                  <a:effectLst/>
-                  <a:uFillTx/>
                   <a:latin typeface="Arial"/>
                   <a:ea typeface="Arial"/>
                 </a:rPr>
                 <a:t>author@colorado.edu</a:t>
               </a:r>
-              <a:endParaRPr lang="en-US" sz="2100" b="0" u="none" strike="noStrike" dirty="0">
+              <a:endParaRPr lang="en-US" sz="2053" dirty="0">
                 <a:solidFill>
                   <a:srgbClr val="000000"/>
                 </a:solidFill>
-                <a:effectLst/>
-                <a:uFillTx/>
                 <a:latin typeface="Times New Roman"/>
               </a:endParaRPr>
             </a:p>
@@ -2280,23 +2204,19 @@
             <a:p>
               <a:pPr algn="ctr"/>
               <a:r>
-                <a:rPr lang="en-US" sz="2100" b="0" u="none" strike="noStrike" dirty="0">
+                <a:rPr lang="en-US" sz="2053" dirty="0">
                   <a:solidFill>
                     <a:srgbClr val="A2A4A3"/>
                   </a:solidFill>
-                  <a:effectLst/>
-                  <a:uFillTx/>
                   <a:latin typeface="Arial"/>
                   <a:ea typeface="Arial"/>
                 </a:rPr>
                 <a:t>ABC Conference 2026, City</a:t>
               </a:r>
-              <a:endParaRPr lang="en-US" sz="2100" b="0" u="none" strike="noStrike" dirty="0">
+              <a:endParaRPr lang="en-US" sz="2053" dirty="0">
                 <a:solidFill>
                   <a:srgbClr val="000000"/>
                 </a:solidFill>
-                <a:effectLst/>
-                <a:uFillTx/>
                 <a:latin typeface="Times New Roman"/>
               </a:endParaRPr>
             </a:p>
@@ -2331,23 +2251,19 @@
             <a:p>
               <a:pPr algn="r"/>
               <a:r>
-                <a:rPr lang="en-US" sz="2100" b="0" u="none" strike="noStrike" dirty="0">
+                <a:rPr lang="en-US" sz="2053" dirty="0">
                   <a:solidFill>
                     <a:srgbClr val="A2A4A3"/>
                   </a:solidFill>
-                  <a:effectLst/>
-                  <a:uFillTx/>
                   <a:latin typeface="Arial"/>
                   <a:ea typeface="Arial"/>
                 </a:rPr>
                 <a:t>https://www.colorado.edu</a:t>
               </a:r>
-              <a:endParaRPr lang="en-US" sz="2100" b="0" u="none" strike="noStrike" dirty="0">
+              <a:endParaRPr lang="en-US" sz="2053" dirty="0">
                 <a:solidFill>
                   <a:srgbClr val="000000"/>
                 </a:solidFill>
-                <a:effectLst/>
-                <a:uFillTx/>
                 <a:latin typeface="Times New Roman"/>
               </a:endParaRPr>
             </a:p>
@@ -2370,8 +2286,8 @@
         </p:nvGrpSpPr>
         <p:grpSpPr>
           <a:xfrm>
-            <a:off x="676440" y="4375080"/>
-            <a:ext cx="13563720" cy="797040"/>
+            <a:off x="661404" y="4278569"/>
+            <a:ext cx="13262216" cy="779323"/>
             <a:chOff x="14925600" y="4375080"/>
             <a:chExt cx="13563720" cy="797040"/>
           </a:xfrm>
@@ -2435,12 +2351,10 @@
             </a:bodyPr>
             <a:lstStyle/>
             <a:p>
-              <a:endParaRPr lang="en-US" sz="2400" b="0" u="none" strike="noStrike">
+              <a:endParaRPr lang="en-US" sz="2347">
                 <a:solidFill>
                   <a:srgbClr val="000000"/>
                 </a:solidFill>
-                <a:effectLst/>
-                <a:uFillTx/>
                 <a:latin typeface="Times New Roman"/>
               </a:endParaRPr>
             </a:p>
@@ -2480,23 +2394,19 @@
             <a:lstStyle/>
             <a:p>
               <a:r>
-                <a:rPr lang="en-US" sz="4200" b="1" u="none" strike="noStrike" dirty="0">
+                <a:rPr lang="en-US" sz="4107" b="1" dirty="0">
                   <a:solidFill>
                     <a:srgbClr val="000000"/>
                   </a:solidFill>
-                  <a:effectLst/>
-                  <a:uFillTx/>
                   <a:latin typeface="Arial"/>
                   <a:ea typeface="Arial"/>
                 </a:rPr>
                 <a:t>Column 1</a:t>
               </a:r>
-              <a:endParaRPr lang="en-US" sz="4200" b="0" u="none" strike="noStrike" dirty="0">
+              <a:endParaRPr lang="en-US" sz="4107" dirty="0">
                 <a:solidFill>
                   <a:srgbClr val="000000"/>
                 </a:solidFill>
-                <a:effectLst/>
-                <a:uFillTx/>
                 <a:latin typeface="Times New Roman"/>
               </a:endParaRPr>
             </a:p>

</xml_diff>

<commit_message>
Restore poster dimensions to 35.61" x 47.48" for vertical trimmer disabled
The previous dimension change to 34.82" x 46.43" assumed the HP DesignJet
vertical trimmer was active. With the trimmer disabled, the printer supports
the full 35.61" x 47.48" printable area. Restore all templates and docs to
the original size and regenerate PDFs.
</commit_message>
<xml_diff>
--- a/powerpoint/poster.pptx
+++ b/powerpoint/poster.pptx
@@ -7,14 +7,14 @@
   <p:sldIdLst>
     <p:sldId id="256" r:id="rId2"/>
   </p:sldIdLst>
-  <p:sldSz cx="42456100" cy="31838900"/>
+  <p:sldSz cx="43421300" cy="32561213"/>
   <p:notesSz cx="7772400" cy="10058400"/>
   <p:defaultTextStyle>
     <a:defPPr>
       <a:defRPr lang="en-US"/>
     </a:defPPr>
-    <a:lvl1pPr marL="0" algn="l" defTabSz="894009" rtl="0" eaLnBrk="1" latinLnBrk="0" hangingPunct="1">
-      <a:defRPr sz="1760" kern="1200">
+    <a:lvl1pPr marL="0" algn="l" defTabSz="914400" rtl="0" eaLnBrk="1" latinLnBrk="0" hangingPunct="1">
+      <a:defRPr sz="1800" kern="1200">
         <a:solidFill>
           <a:schemeClr val="tx1"/>
         </a:solidFill>
@@ -23,8 +23,8 @@
         <a:cs typeface="+mn-cs"/>
       </a:defRPr>
     </a:lvl1pPr>
-    <a:lvl2pPr marL="447004" algn="l" defTabSz="894009" rtl="0" eaLnBrk="1" latinLnBrk="0" hangingPunct="1">
-      <a:defRPr sz="1760" kern="1200">
+    <a:lvl2pPr marL="457200" algn="l" defTabSz="914400" rtl="0" eaLnBrk="1" latinLnBrk="0" hangingPunct="1">
+      <a:defRPr sz="1800" kern="1200">
         <a:solidFill>
           <a:schemeClr val="tx1"/>
         </a:solidFill>
@@ -33,8 +33,8 @@
         <a:cs typeface="+mn-cs"/>
       </a:defRPr>
     </a:lvl2pPr>
-    <a:lvl3pPr marL="894009" algn="l" defTabSz="894009" rtl="0" eaLnBrk="1" latinLnBrk="0" hangingPunct="1">
-      <a:defRPr sz="1760" kern="1200">
+    <a:lvl3pPr marL="914400" algn="l" defTabSz="914400" rtl="0" eaLnBrk="1" latinLnBrk="0" hangingPunct="1">
+      <a:defRPr sz="1800" kern="1200">
         <a:solidFill>
           <a:schemeClr val="tx1"/>
         </a:solidFill>
@@ -43,8 +43,8 @@
         <a:cs typeface="+mn-cs"/>
       </a:defRPr>
     </a:lvl3pPr>
-    <a:lvl4pPr marL="1341013" algn="l" defTabSz="894009" rtl="0" eaLnBrk="1" latinLnBrk="0" hangingPunct="1">
-      <a:defRPr sz="1760" kern="1200">
+    <a:lvl4pPr marL="1371600" algn="l" defTabSz="914400" rtl="0" eaLnBrk="1" latinLnBrk="0" hangingPunct="1">
+      <a:defRPr sz="1800" kern="1200">
         <a:solidFill>
           <a:schemeClr val="tx1"/>
         </a:solidFill>
@@ -53,8 +53,8 @@
         <a:cs typeface="+mn-cs"/>
       </a:defRPr>
     </a:lvl4pPr>
-    <a:lvl5pPr marL="1788018" algn="l" defTabSz="894009" rtl="0" eaLnBrk="1" latinLnBrk="0" hangingPunct="1">
-      <a:defRPr sz="1760" kern="1200">
+    <a:lvl5pPr marL="1828800" algn="l" defTabSz="914400" rtl="0" eaLnBrk="1" latinLnBrk="0" hangingPunct="1">
+      <a:defRPr sz="1800" kern="1200">
         <a:solidFill>
           <a:schemeClr val="tx1"/>
         </a:solidFill>
@@ -63,8 +63,8 @@
         <a:cs typeface="+mn-cs"/>
       </a:defRPr>
     </a:lvl5pPr>
-    <a:lvl6pPr marL="2235022" algn="l" defTabSz="894009" rtl="0" eaLnBrk="1" latinLnBrk="0" hangingPunct="1">
-      <a:defRPr sz="1760" kern="1200">
+    <a:lvl6pPr marL="2286000" algn="l" defTabSz="914400" rtl="0" eaLnBrk="1" latinLnBrk="0" hangingPunct="1">
+      <a:defRPr sz="1800" kern="1200">
         <a:solidFill>
           <a:schemeClr val="tx1"/>
         </a:solidFill>
@@ -73,8 +73,8 @@
         <a:cs typeface="+mn-cs"/>
       </a:defRPr>
     </a:lvl6pPr>
-    <a:lvl7pPr marL="2682027" algn="l" defTabSz="894009" rtl="0" eaLnBrk="1" latinLnBrk="0" hangingPunct="1">
-      <a:defRPr sz="1760" kern="1200">
+    <a:lvl7pPr marL="2743200" algn="l" defTabSz="914400" rtl="0" eaLnBrk="1" latinLnBrk="0" hangingPunct="1">
+      <a:defRPr sz="1800" kern="1200">
         <a:solidFill>
           <a:schemeClr val="tx1"/>
         </a:solidFill>
@@ -83,8 +83,8 @@
         <a:cs typeface="+mn-cs"/>
       </a:defRPr>
     </a:lvl7pPr>
-    <a:lvl8pPr marL="3129031" algn="l" defTabSz="894009" rtl="0" eaLnBrk="1" latinLnBrk="0" hangingPunct="1">
-      <a:defRPr sz="1760" kern="1200">
+    <a:lvl8pPr marL="3200400" algn="l" defTabSz="914400" rtl="0" eaLnBrk="1" latinLnBrk="0" hangingPunct="1">
+      <a:defRPr sz="1800" kern="1200">
         <a:solidFill>
           <a:schemeClr val="tx1"/>
         </a:solidFill>
@@ -93,8 +93,8 @@
         <a:cs typeface="+mn-cs"/>
       </a:defRPr>
     </a:lvl8pPr>
-    <a:lvl9pPr marL="3576036" algn="l" defTabSz="894009" rtl="0" eaLnBrk="1" latinLnBrk="0" hangingPunct="1">
-      <a:defRPr sz="1760" kern="1200">
+    <a:lvl9pPr marL="3657600" algn="l" defTabSz="914400" rtl="0" eaLnBrk="1" latinLnBrk="0" hangingPunct="1">
+      <a:defRPr sz="1800" kern="1200">
         <a:solidFill>
           <a:schemeClr val="tx1"/>
         </a:solidFill>
@@ -107,12 +107,12 @@
   <p:extLst>
     <p:ext uri="{EFAFB233-063F-42B5-8137-9DF3F51BA10A}">
       <p15:sldGuideLst xmlns:p15="http://schemas.microsoft.com/office/powerpoint/2012/main">
-        <p15:guide id="1" orient="horz" pos="3176" userDrawn="1">
+        <p15:guide id="1" orient="horz" pos="3248" userDrawn="1">
           <p15:clr>
             <a:srgbClr val="A4A3A4"/>
           </p15:clr>
         </p15:guide>
-        <p15:guide id="2" pos="395" userDrawn="1">
+        <p15:guide id="2" pos="404" userDrawn="1">
           <p15:clr>
             <a:srgbClr val="A4A3A4"/>
           </p15:clr>
@@ -152,8 +152,8 @@
         </p:nvSpPr>
         <p:spPr>
           <a:xfrm>
-            <a:off x="2122546" y="3587244"/>
-            <a:ext cx="38210402" cy="595869"/>
+            <a:off x="2170800" y="1284840"/>
+            <a:ext cx="39079080" cy="5376960"/>
           </a:xfrm>
           <a:prstGeom prst="rect">
             <a:avLst/>
@@ -167,17 +167,12 @@
           <a:bodyPr lIns="0" tIns="0" rIns="0" bIns="0" anchor="ctr">
             <a:spAutoFit/>
           </a:bodyPr>
-          <a:lstStyle>
-            <a:lvl1pPr indent="0" algn="ctr">
-              <a:buNone/>
-              <a:defRPr/>
-            </a:lvl1pPr>
-          </a:lstStyle>
+          <a:lstStyle/>
           <a:p>
             <a:pPr indent="0" algn="ctr">
               <a:buNone/>
             </a:pPr>
-            <a:endParaRPr lang="en-US" sz="4302" b="0" u="none" strike="noStrike">
+            <a:endParaRPr lang="en-US" sz="4400" b="0" u="none" strike="noStrike">
               <a:solidFill>
                 <a:srgbClr val="000000"/>
               </a:solidFill>
@@ -200,8 +195,8 @@
         </p:nvSpPr>
         <p:spPr>
           <a:xfrm>
-            <a:off x="2122546" y="16282380"/>
-            <a:ext cx="38210402" cy="433388"/>
+            <a:off x="2170800" y="7535160"/>
+            <a:ext cx="39079080" cy="18676440"/>
           </a:xfrm>
           <a:prstGeom prst="rect">
             <a:avLst/>
@@ -215,17 +210,12 @@
           <a:bodyPr lIns="0" tIns="0" rIns="0" bIns="0" anchor="ctr">
             <a:spAutoFit/>
           </a:bodyPr>
-          <a:lstStyle>
-            <a:lvl1pPr indent="0" algn="ctr">
-              <a:buNone/>
-              <a:defRPr/>
-            </a:lvl1pPr>
-          </a:lstStyle>
+          <a:lstStyle/>
           <a:p>
             <a:pPr indent="0" algn="ctr">
               <a:buNone/>
             </a:pPr>
-            <a:endParaRPr lang="en-US" sz="3129" b="0" u="none" strike="noStrike">
+            <a:endParaRPr lang="en-US" sz="3200" b="0" u="none" strike="noStrike">
               <a:solidFill>
                 <a:srgbClr val="000000"/>
               </a:solidFill>
@@ -274,7 +264,7 @@
   </p:sldLayoutIdLst>
   <p:txStyles>
     <p:titleStyle>
-      <a:lvl1pPr algn="l" defTabSz="894100" rtl="0" eaLnBrk="1" latinLnBrk="0" hangingPunct="1">
+      <a:lvl1pPr algn="l" defTabSz="914400" rtl="0" eaLnBrk="1" latinLnBrk="0" hangingPunct="1">
         <a:lnSpc>
           <a:spcPct val="90000"/>
         </a:lnSpc>
@@ -282,7 +272,7 @@
           <a:spcPct val="0"/>
         </a:spcBef>
         <a:buNone/>
-        <a:defRPr sz="4302" kern="1200">
+        <a:defRPr sz="4400" kern="1200">
           <a:solidFill>
             <a:schemeClr val="tx1"/>
           </a:solidFill>
@@ -293,16 +283,16 @@
       </a:lvl1pPr>
     </p:titleStyle>
     <p:bodyStyle>
-      <a:lvl1pPr marL="223525" indent="-223525" algn="l" defTabSz="894100" rtl="0" eaLnBrk="1" latinLnBrk="0" hangingPunct="1">
+      <a:lvl1pPr marL="228600" indent="-228600" algn="l" defTabSz="914400" rtl="0" eaLnBrk="1" latinLnBrk="0" hangingPunct="1">
         <a:lnSpc>
           <a:spcPct val="90000"/>
         </a:lnSpc>
         <a:spcBef>
-          <a:spcPts val="978"/>
+          <a:spcPts val="1000"/>
         </a:spcBef>
         <a:buFont typeface="Arial" panose="020B0604020202020204" pitchFamily="34" charset="0"/>
         <a:buChar char="•"/>
-        <a:defRPr sz="2738" kern="1200">
+        <a:defRPr sz="2800" kern="1200">
           <a:solidFill>
             <a:schemeClr val="tx1"/>
           </a:solidFill>
@@ -311,16 +301,16 @@
           <a:cs typeface="+mn-cs"/>
         </a:defRPr>
       </a:lvl1pPr>
-      <a:lvl2pPr marL="670575" indent="-223525" algn="l" defTabSz="894100" rtl="0" eaLnBrk="1" latinLnBrk="0" hangingPunct="1">
+      <a:lvl2pPr marL="685800" indent="-228600" algn="l" defTabSz="914400" rtl="0" eaLnBrk="1" latinLnBrk="0" hangingPunct="1">
         <a:lnSpc>
           <a:spcPct val="90000"/>
         </a:lnSpc>
         <a:spcBef>
-          <a:spcPts val="489"/>
+          <a:spcPts val="500"/>
         </a:spcBef>
         <a:buFont typeface="Arial" panose="020B0604020202020204" pitchFamily="34" charset="0"/>
         <a:buChar char="•"/>
-        <a:defRPr sz="2347" kern="1200">
+        <a:defRPr sz="2400" kern="1200">
           <a:solidFill>
             <a:schemeClr val="tx1"/>
           </a:solidFill>
@@ -329,16 +319,16 @@
           <a:cs typeface="+mn-cs"/>
         </a:defRPr>
       </a:lvl2pPr>
-      <a:lvl3pPr marL="1117625" indent="-223525" algn="l" defTabSz="894100" rtl="0" eaLnBrk="1" latinLnBrk="0" hangingPunct="1">
+      <a:lvl3pPr marL="1143000" indent="-228600" algn="l" defTabSz="914400" rtl="0" eaLnBrk="1" latinLnBrk="0" hangingPunct="1">
         <a:lnSpc>
           <a:spcPct val="90000"/>
         </a:lnSpc>
         <a:spcBef>
-          <a:spcPts val="489"/>
+          <a:spcPts val="500"/>
         </a:spcBef>
         <a:buFont typeface="Arial" panose="020B0604020202020204" pitchFamily="34" charset="0"/>
         <a:buChar char="•"/>
-        <a:defRPr sz="1956" kern="1200">
+        <a:defRPr sz="2000" kern="1200">
           <a:solidFill>
             <a:schemeClr val="tx1"/>
           </a:solidFill>
@@ -347,16 +337,16 @@
           <a:cs typeface="+mn-cs"/>
         </a:defRPr>
       </a:lvl3pPr>
-      <a:lvl4pPr marL="1564676" indent="-223525" algn="l" defTabSz="894100" rtl="0" eaLnBrk="1" latinLnBrk="0" hangingPunct="1">
+      <a:lvl4pPr marL="1600200" indent="-228600" algn="l" defTabSz="914400" rtl="0" eaLnBrk="1" latinLnBrk="0" hangingPunct="1">
         <a:lnSpc>
           <a:spcPct val="90000"/>
         </a:lnSpc>
         <a:spcBef>
-          <a:spcPts val="489"/>
+          <a:spcPts val="500"/>
         </a:spcBef>
         <a:buFont typeface="Arial" panose="020B0604020202020204" pitchFamily="34" charset="0"/>
         <a:buChar char="•"/>
-        <a:defRPr sz="1760" kern="1200">
+        <a:defRPr sz="1800" kern="1200">
           <a:solidFill>
             <a:schemeClr val="tx1"/>
           </a:solidFill>
@@ -365,16 +355,16 @@
           <a:cs typeface="+mn-cs"/>
         </a:defRPr>
       </a:lvl4pPr>
-      <a:lvl5pPr marL="2011726" indent="-223525" algn="l" defTabSz="894100" rtl="0" eaLnBrk="1" latinLnBrk="0" hangingPunct="1">
+      <a:lvl5pPr marL="2057400" indent="-228600" algn="l" defTabSz="914400" rtl="0" eaLnBrk="1" latinLnBrk="0" hangingPunct="1">
         <a:lnSpc>
           <a:spcPct val="90000"/>
         </a:lnSpc>
         <a:spcBef>
-          <a:spcPts val="489"/>
+          <a:spcPts val="500"/>
         </a:spcBef>
         <a:buFont typeface="Arial" panose="020B0604020202020204" pitchFamily="34" charset="0"/>
         <a:buChar char="•"/>
-        <a:defRPr sz="1760" kern="1200">
+        <a:defRPr sz="1800" kern="1200">
           <a:solidFill>
             <a:schemeClr val="tx1"/>
           </a:solidFill>
@@ -383,16 +373,16 @@
           <a:cs typeface="+mn-cs"/>
         </a:defRPr>
       </a:lvl5pPr>
-      <a:lvl6pPr marL="2458776" indent="-223525" algn="l" defTabSz="894100" rtl="0" eaLnBrk="1" latinLnBrk="0" hangingPunct="1">
+      <a:lvl6pPr marL="2514600" indent="-228600" algn="l" defTabSz="914400" rtl="0" eaLnBrk="1" latinLnBrk="0" hangingPunct="1">
         <a:lnSpc>
           <a:spcPct val="90000"/>
         </a:lnSpc>
         <a:spcBef>
-          <a:spcPts val="489"/>
+          <a:spcPts val="500"/>
         </a:spcBef>
         <a:buFont typeface="Arial" panose="020B0604020202020204" pitchFamily="34" charset="0"/>
         <a:buChar char="•"/>
-        <a:defRPr sz="1760" kern="1200">
+        <a:defRPr sz="1800" kern="1200">
           <a:solidFill>
             <a:schemeClr val="tx1"/>
           </a:solidFill>
@@ -401,16 +391,16 @@
           <a:cs typeface="+mn-cs"/>
         </a:defRPr>
       </a:lvl6pPr>
-      <a:lvl7pPr marL="2905826" indent="-223525" algn="l" defTabSz="894100" rtl="0" eaLnBrk="1" latinLnBrk="0" hangingPunct="1">
+      <a:lvl7pPr marL="2971800" indent="-228600" algn="l" defTabSz="914400" rtl="0" eaLnBrk="1" latinLnBrk="0" hangingPunct="1">
         <a:lnSpc>
           <a:spcPct val="90000"/>
         </a:lnSpc>
         <a:spcBef>
-          <a:spcPts val="489"/>
+          <a:spcPts val="500"/>
         </a:spcBef>
         <a:buFont typeface="Arial" panose="020B0604020202020204" pitchFamily="34" charset="0"/>
         <a:buChar char="•"/>
-        <a:defRPr sz="1760" kern="1200">
+        <a:defRPr sz="1800" kern="1200">
           <a:solidFill>
             <a:schemeClr val="tx1"/>
           </a:solidFill>
@@ -419,16 +409,16 @@
           <a:cs typeface="+mn-cs"/>
         </a:defRPr>
       </a:lvl7pPr>
-      <a:lvl8pPr marL="3352876" indent="-223525" algn="l" defTabSz="894100" rtl="0" eaLnBrk="1" latinLnBrk="0" hangingPunct="1">
+      <a:lvl8pPr marL="3429000" indent="-228600" algn="l" defTabSz="914400" rtl="0" eaLnBrk="1" latinLnBrk="0" hangingPunct="1">
         <a:lnSpc>
           <a:spcPct val="90000"/>
         </a:lnSpc>
         <a:spcBef>
-          <a:spcPts val="489"/>
+          <a:spcPts val="500"/>
         </a:spcBef>
         <a:buFont typeface="Arial" panose="020B0604020202020204" pitchFamily="34" charset="0"/>
         <a:buChar char="•"/>
-        <a:defRPr sz="1760" kern="1200">
+        <a:defRPr sz="1800" kern="1200">
           <a:solidFill>
             <a:schemeClr val="tx1"/>
           </a:solidFill>
@@ -437,16 +427,16 @@
           <a:cs typeface="+mn-cs"/>
         </a:defRPr>
       </a:lvl8pPr>
-      <a:lvl9pPr marL="3799926" indent="-223525" algn="l" defTabSz="894100" rtl="0" eaLnBrk="1" latinLnBrk="0" hangingPunct="1">
+      <a:lvl9pPr marL="3886200" indent="-228600" algn="l" defTabSz="914400" rtl="0" eaLnBrk="1" latinLnBrk="0" hangingPunct="1">
         <a:lnSpc>
           <a:spcPct val="90000"/>
         </a:lnSpc>
         <a:spcBef>
-          <a:spcPts val="489"/>
+          <a:spcPts val="500"/>
         </a:spcBef>
         <a:buFont typeface="Arial" panose="020B0604020202020204" pitchFamily="34" charset="0"/>
         <a:buChar char="•"/>
-        <a:defRPr sz="1760" kern="1200">
+        <a:defRPr sz="1800" kern="1200">
           <a:solidFill>
             <a:schemeClr val="tx1"/>
           </a:solidFill>
@@ -460,8 +450,8 @@
       <a:defPPr>
         <a:defRPr lang="en-US"/>
       </a:defPPr>
-      <a:lvl1pPr marL="0" algn="l" defTabSz="894100" rtl="0" eaLnBrk="1" latinLnBrk="0" hangingPunct="1">
-        <a:defRPr sz="1760" kern="1200">
+      <a:lvl1pPr marL="0" algn="l" defTabSz="914400" rtl="0" eaLnBrk="1" latinLnBrk="0" hangingPunct="1">
+        <a:defRPr sz="1800" kern="1200">
           <a:solidFill>
             <a:schemeClr val="tx1"/>
           </a:solidFill>
@@ -470,8 +460,8 @@
           <a:cs typeface="+mn-cs"/>
         </a:defRPr>
       </a:lvl1pPr>
-      <a:lvl2pPr marL="447050" algn="l" defTabSz="894100" rtl="0" eaLnBrk="1" latinLnBrk="0" hangingPunct="1">
-        <a:defRPr sz="1760" kern="1200">
+      <a:lvl2pPr marL="457200" algn="l" defTabSz="914400" rtl="0" eaLnBrk="1" latinLnBrk="0" hangingPunct="1">
+        <a:defRPr sz="1800" kern="1200">
           <a:solidFill>
             <a:schemeClr val="tx1"/>
           </a:solidFill>
@@ -480,8 +470,8 @@
           <a:cs typeface="+mn-cs"/>
         </a:defRPr>
       </a:lvl2pPr>
-      <a:lvl3pPr marL="894100" algn="l" defTabSz="894100" rtl="0" eaLnBrk="1" latinLnBrk="0" hangingPunct="1">
-        <a:defRPr sz="1760" kern="1200">
+      <a:lvl3pPr marL="914400" algn="l" defTabSz="914400" rtl="0" eaLnBrk="1" latinLnBrk="0" hangingPunct="1">
+        <a:defRPr sz="1800" kern="1200">
           <a:solidFill>
             <a:schemeClr val="tx1"/>
           </a:solidFill>
@@ -490,8 +480,8 @@
           <a:cs typeface="+mn-cs"/>
         </a:defRPr>
       </a:lvl3pPr>
-      <a:lvl4pPr marL="1341150" algn="l" defTabSz="894100" rtl="0" eaLnBrk="1" latinLnBrk="0" hangingPunct="1">
-        <a:defRPr sz="1760" kern="1200">
+      <a:lvl4pPr marL="1371600" algn="l" defTabSz="914400" rtl="0" eaLnBrk="1" latinLnBrk="0" hangingPunct="1">
+        <a:defRPr sz="1800" kern="1200">
           <a:solidFill>
             <a:schemeClr val="tx1"/>
           </a:solidFill>
@@ -500,8 +490,8 @@
           <a:cs typeface="+mn-cs"/>
         </a:defRPr>
       </a:lvl4pPr>
-      <a:lvl5pPr marL="1788201" algn="l" defTabSz="894100" rtl="0" eaLnBrk="1" latinLnBrk="0" hangingPunct="1">
-        <a:defRPr sz="1760" kern="1200">
+      <a:lvl5pPr marL="1828800" algn="l" defTabSz="914400" rtl="0" eaLnBrk="1" latinLnBrk="0" hangingPunct="1">
+        <a:defRPr sz="1800" kern="1200">
           <a:solidFill>
             <a:schemeClr val="tx1"/>
           </a:solidFill>
@@ -510,8 +500,8 @@
           <a:cs typeface="+mn-cs"/>
         </a:defRPr>
       </a:lvl5pPr>
-      <a:lvl6pPr marL="2235251" algn="l" defTabSz="894100" rtl="0" eaLnBrk="1" latinLnBrk="0" hangingPunct="1">
-        <a:defRPr sz="1760" kern="1200">
+      <a:lvl6pPr marL="2286000" algn="l" defTabSz="914400" rtl="0" eaLnBrk="1" latinLnBrk="0" hangingPunct="1">
+        <a:defRPr sz="1800" kern="1200">
           <a:solidFill>
             <a:schemeClr val="tx1"/>
           </a:solidFill>
@@ -520,8 +510,8 @@
           <a:cs typeface="+mn-cs"/>
         </a:defRPr>
       </a:lvl6pPr>
-      <a:lvl7pPr marL="2682301" algn="l" defTabSz="894100" rtl="0" eaLnBrk="1" latinLnBrk="0" hangingPunct="1">
-        <a:defRPr sz="1760" kern="1200">
+      <a:lvl7pPr marL="2743200" algn="l" defTabSz="914400" rtl="0" eaLnBrk="1" latinLnBrk="0" hangingPunct="1">
+        <a:defRPr sz="1800" kern="1200">
           <a:solidFill>
             <a:schemeClr val="tx1"/>
           </a:solidFill>
@@ -530,8 +520,8 @@
           <a:cs typeface="+mn-cs"/>
         </a:defRPr>
       </a:lvl7pPr>
-      <a:lvl8pPr marL="3129351" algn="l" defTabSz="894100" rtl="0" eaLnBrk="1" latinLnBrk="0" hangingPunct="1">
-        <a:defRPr sz="1760" kern="1200">
+      <a:lvl8pPr marL="3200400" algn="l" defTabSz="914400" rtl="0" eaLnBrk="1" latinLnBrk="0" hangingPunct="1">
+        <a:defRPr sz="1800" kern="1200">
           <a:solidFill>
             <a:schemeClr val="tx1"/>
           </a:solidFill>
@@ -540,8 +530,8 @@
           <a:cs typeface="+mn-cs"/>
         </a:defRPr>
       </a:lvl8pPr>
-      <a:lvl9pPr marL="3576401" algn="l" defTabSz="894100" rtl="0" eaLnBrk="1" latinLnBrk="0" hangingPunct="1">
-        <a:defRPr sz="1760" kern="1200">
+      <a:lvl9pPr marL="3657600" algn="l" defTabSz="914400" rtl="0" eaLnBrk="1" latinLnBrk="0" hangingPunct="1">
+        <a:defRPr sz="1800" kern="1200">
           <a:solidFill>
             <a:schemeClr val="tx1"/>
           </a:solidFill>
@@ -580,8 +570,8 @@
         </p:nvSpPr>
         <p:spPr>
           <a:xfrm>
-            <a:off x="0" y="741"/>
-            <a:ext cx="42450214" cy="31838188"/>
+            <a:off x="0" y="0"/>
+            <a:ext cx="43415280" cy="32562000"/>
           </a:xfrm>
           <a:custGeom>
             <a:avLst/>
@@ -623,10 +613,12 @@
           </a:bodyPr>
           <a:lstStyle/>
           <a:p>
-            <a:endParaRPr lang="en-US" sz="2347">
+            <a:endParaRPr lang="en-US" sz="2400" b="0" u="none" strike="noStrike">
               <a:solidFill>
                 <a:srgbClr val="000000"/>
               </a:solidFill>
+              <a:effectLst/>
+              <a:uFillTx/>
               <a:latin typeface="Times New Roman"/>
             </a:endParaRPr>
           </a:p>
@@ -640,8 +632,8 @@
         </p:nvSpPr>
         <p:spPr>
           <a:xfrm>
-            <a:off x="0" y="741"/>
-            <a:ext cx="42450214" cy="31838188"/>
+            <a:off x="0" y="0"/>
+            <a:ext cx="43415280" cy="32562000"/>
           </a:xfrm>
           <a:custGeom>
             <a:avLst/>
@@ -683,10 +675,12 @@
           </a:bodyPr>
           <a:lstStyle/>
           <a:p>
-            <a:endParaRPr lang="en-US" sz="2347">
+            <a:endParaRPr lang="en-US" sz="2400" b="0" u="none" strike="noStrike">
               <a:solidFill>
                 <a:srgbClr val="000000"/>
               </a:solidFill>
+              <a:effectLst/>
+              <a:uFillTx/>
               <a:latin typeface="Times New Roman"/>
             </a:endParaRPr>
           </a:p>
@@ -702,8 +696,8 @@
         </p:nvSpPr>
         <p:spPr>
           <a:xfrm>
-            <a:off x="0" y="741"/>
-            <a:ext cx="42450214" cy="31838188"/>
+            <a:off x="0" y="0"/>
+            <a:ext cx="43415280" cy="32562000"/>
           </a:xfrm>
           <a:custGeom>
             <a:avLst/>
@@ -745,10 +739,12 @@
           </a:bodyPr>
           <a:lstStyle/>
           <a:p>
-            <a:endParaRPr lang="en-US" sz="2347">
+            <a:endParaRPr lang="en-US" sz="2400" b="0" u="none" strike="noStrike">
               <a:solidFill>
                 <a:srgbClr val="000000"/>
               </a:solidFill>
+              <a:effectLst/>
+              <a:uFillTx/>
               <a:latin typeface="Times New Roman"/>
             </a:endParaRPr>
           </a:p>
@@ -770,8 +766,8 @@
         </p:nvGrpSpPr>
         <p:grpSpPr>
           <a:xfrm>
-            <a:off x="14593823" y="4278569"/>
-            <a:ext cx="13262216" cy="779323"/>
+            <a:off x="14925600" y="4375080"/>
+            <a:ext cx="13563720" cy="797040"/>
             <a:chOff x="14925600" y="4375080"/>
             <a:chExt cx="13563720" cy="797040"/>
           </a:xfrm>
@@ -829,10 +825,12 @@
             </a:bodyPr>
             <a:lstStyle/>
             <a:p>
-              <a:endParaRPr lang="en-US" sz="2347">
+              <a:endParaRPr lang="en-US" sz="2400" b="0" u="none" strike="noStrike">
                 <a:solidFill>
                   <a:srgbClr val="000000"/>
                 </a:solidFill>
+                <a:effectLst/>
+                <a:uFillTx/>
                 <a:latin typeface="Times New Roman"/>
               </a:endParaRPr>
             </a:p>
@@ -849,7 +847,7 @@
           <p:spPr>
             <a:xfrm>
               <a:off x="20492280" y="4375080"/>
-              <a:ext cx="2454251" cy="646402"/>
+              <a:ext cx="2430720" cy="596160"/>
             </a:xfrm>
             <a:prstGeom prst="rect">
               <a:avLst/>
@@ -866,19 +864,23 @@
             <a:lstStyle/>
             <a:p>
               <a:r>
-                <a:rPr lang="en-US" sz="4107" b="1" dirty="0">
+                <a:rPr lang="en-US" sz="4200" b="1" u="none" strike="noStrike" dirty="0">
                   <a:solidFill>
                     <a:srgbClr val="000000"/>
                   </a:solidFill>
+                  <a:effectLst/>
+                  <a:uFillTx/>
                   <a:latin typeface="Arial"/>
                   <a:ea typeface="Arial"/>
                 </a:rPr>
                 <a:t>Column 2</a:t>
               </a:r>
-              <a:endParaRPr lang="en-US" sz="4107" dirty="0">
+              <a:endParaRPr lang="en-US" sz="4200" b="0" u="none" strike="noStrike" dirty="0">
                 <a:solidFill>
                   <a:srgbClr val="000000"/>
                 </a:solidFill>
+                <a:effectLst/>
+                <a:uFillTx/>
                 <a:latin typeface="Times New Roman"/>
               </a:endParaRPr>
             </a:p>
@@ -901,8 +903,8 @@
         </p:nvGrpSpPr>
         <p:grpSpPr>
           <a:xfrm>
-            <a:off x="28526242" y="4278569"/>
-            <a:ext cx="13253416" cy="779323"/>
+            <a:off x="29174760" y="4375080"/>
+            <a:ext cx="13554720" cy="797040"/>
             <a:chOff x="29174760" y="4375080"/>
             <a:chExt cx="13554720" cy="797040"/>
           </a:xfrm>
@@ -960,10 +962,12 @@
             </a:bodyPr>
             <a:lstStyle/>
             <a:p>
-              <a:endParaRPr lang="en-US" sz="2347">
+              <a:endParaRPr lang="en-US" sz="2400" b="0" u="none" strike="noStrike">
                 <a:solidFill>
                   <a:srgbClr val="000000"/>
                 </a:solidFill>
+                <a:effectLst/>
+                <a:uFillTx/>
                 <a:latin typeface="Times New Roman"/>
               </a:endParaRPr>
             </a:p>
@@ -980,7 +984,7 @@
           <p:spPr>
             <a:xfrm>
               <a:off x="34735320" y="4375080"/>
-              <a:ext cx="2454251" cy="646402"/>
+              <a:ext cx="2430720" cy="596160"/>
             </a:xfrm>
             <a:prstGeom prst="rect">
               <a:avLst/>
@@ -997,19 +1001,23 @@
             <a:lstStyle/>
             <a:p>
               <a:r>
-                <a:rPr lang="en-US" sz="4107" b="1" dirty="0">
+                <a:rPr lang="en-US" sz="4200" b="1" u="none" strike="noStrike" dirty="0">
                   <a:solidFill>
                     <a:srgbClr val="000000"/>
                   </a:solidFill>
+                  <a:effectLst/>
+                  <a:uFillTx/>
                   <a:latin typeface="Arial"/>
                   <a:ea typeface="Arial"/>
                 </a:rPr>
                 <a:t>Column 3</a:t>
               </a:r>
-              <a:endParaRPr lang="en-US" sz="4107" dirty="0">
+              <a:endParaRPr lang="en-US" sz="4200" b="0" u="none" strike="noStrike" dirty="0">
                 <a:solidFill>
                   <a:srgbClr val="000000"/>
                 </a:solidFill>
+                <a:effectLst/>
+                <a:uFillTx/>
                 <a:latin typeface="Times New Roman"/>
               </a:endParaRPr>
             </a:p>
@@ -1030,10 +1038,10 @@
         </p:nvGrpSpPr>
         <p:grpSpPr>
           <a:xfrm>
-            <a:off x="28526242" y="5628831"/>
-            <a:ext cx="13253416" cy="1266996"/>
+            <a:off x="29174760" y="5756040"/>
+            <a:ext cx="13554720" cy="1275120"/>
             <a:chOff x="29174760" y="5756040"/>
-            <a:chExt cx="13554720" cy="1295800"/>
+            <a:chExt cx="13554720" cy="1275120"/>
           </a:xfrm>
         </p:grpSpPr>
         <p:sp>
@@ -1087,10 +1095,12 @@
             </a:bodyPr>
             <a:lstStyle/>
             <a:p>
-              <a:endParaRPr lang="en-US" sz="2347">
+              <a:endParaRPr lang="en-US" sz="2400" b="0" u="none" strike="noStrike">
                 <a:solidFill>
                   <a:srgbClr val="000000"/>
                 </a:solidFill>
+                <a:effectLst/>
+                <a:uFillTx/>
                 <a:latin typeface="Times New Roman"/>
               </a:endParaRPr>
             </a:p>
@@ -1105,7 +1115,7 @@
           <p:spPr>
             <a:xfrm>
               <a:off x="34512480" y="5756040"/>
-              <a:ext cx="2906738" cy="646402"/>
+              <a:ext cx="2876760" cy="596160"/>
             </a:xfrm>
             <a:prstGeom prst="rect">
               <a:avLst/>
@@ -1122,19 +1132,23 @@
             <a:lstStyle/>
             <a:p>
               <a:r>
-                <a:rPr lang="en-US" sz="4107" b="1" dirty="0">
+                <a:rPr lang="en-US" sz="4200" b="1" u="none" strike="noStrike" dirty="0">
                   <a:solidFill>
                     <a:srgbClr val="000000"/>
                   </a:solidFill>
+                  <a:effectLst/>
+                  <a:uFillTx/>
                   <a:latin typeface="Arial"/>
                   <a:ea typeface="Arial"/>
                 </a:rPr>
                 <a:t>References</a:t>
               </a:r>
-              <a:endParaRPr lang="en-US" sz="4107" dirty="0">
+              <a:endParaRPr lang="en-US" sz="4200" b="0" u="none" strike="noStrike" dirty="0">
                 <a:solidFill>
                   <a:srgbClr val="000000"/>
                 </a:solidFill>
+                <a:effectLst/>
+                <a:uFillTx/>
                 <a:latin typeface="Times New Roman"/>
               </a:endParaRPr>
             </a:p>
@@ -1149,7 +1163,7 @@
           <p:spPr>
             <a:xfrm>
               <a:off x="29283120" y="6774840"/>
-              <a:ext cx="6027783" cy="277000"/>
+              <a:ext cx="6045840" cy="256320"/>
             </a:xfrm>
             <a:prstGeom prst="rect">
               <a:avLst/>
@@ -1166,49 +1180,59 @@
             <a:lstStyle/>
             <a:p>
               <a:r>
-                <a:rPr lang="en-US" dirty="0">
+                <a:rPr lang="en-US" sz="1800" b="0" u="none" strike="noStrike" dirty="0">
                   <a:solidFill>
                     <a:srgbClr val="565A5C"/>
                   </a:solidFill>
+                  <a:effectLst/>
+                  <a:uFillTx/>
                   <a:latin typeface="Arial"/>
                   <a:ea typeface="Arial"/>
                 </a:rPr>
                 <a:t>1. Author, A. "Title of Article." </a:t>
               </a:r>
               <a:r>
-                <a:rPr lang="en-US" i="1" dirty="0">
+                <a:rPr lang="en-US" sz="1800" b="0" i="1" u="none" strike="noStrike" dirty="0">
                   <a:solidFill>
                     <a:srgbClr val="565A5C"/>
                   </a:solidFill>
+                  <a:effectLst/>
+                  <a:uFillTx/>
                   <a:latin typeface="Arial"/>
                   <a:ea typeface="Arial"/>
                 </a:rPr>
                 <a:t>Journal Name </a:t>
               </a:r>
               <a:r>
-                <a:rPr lang="en-US" b="1" dirty="0">
+                <a:rPr lang="en-US" sz="1800" b="1" u="none" strike="noStrike" dirty="0">
                   <a:solidFill>
                     <a:srgbClr val="565A5C"/>
                   </a:solidFill>
+                  <a:effectLst/>
+                  <a:uFillTx/>
                   <a:latin typeface="Arial"/>
                   <a:ea typeface="Arial"/>
                 </a:rPr>
                 <a:t>1</a:t>
               </a:r>
               <a:r>
-                <a:rPr lang="en-US" dirty="0">
+                <a:rPr lang="en-US" sz="1800" b="0" u="none" strike="noStrike" dirty="0">
                   <a:solidFill>
                     <a:srgbClr val="565A5C"/>
                   </a:solidFill>
+                  <a:effectLst/>
+                  <a:uFillTx/>
                   <a:latin typeface="Arial"/>
                   <a:ea typeface="Arial"/>
                 </a:rPr>
                 <a:t>, 1–10 (2025).</a:t>
               </a:r>
-              <a:endParaRPr lang="en-US" dirty="0">
+              <a:endParaRPr lang="en-US" sz="1800" b="0" u="none" strike="noStrike" dirty="0">
                 <a:solidFill>
                   <a:srgbClr val="000000"/>
                 </a:solidFill>
+                <a:effectLst/>
+                <a:uFillTx/>
                 <a:latin typeface="Times New Roman"/>
               </a:endParaRPr>
             </a:p>
@@ -1229,10 +1253,10 @@
         </p:nvGrpSpPr>
         <p:grpSpPr>
           <a:xfrm>
-            <a:off x="28523426" y="7553550"/>
-            <a:ext cx="13256232" cy="588695"/>
+            <a:off x="29171880" y="7724520"/>
+            <a:ext cx="13557600" cy="579600"/>
             <a:chOff x="29171880" y="7724520"/>
-            <a:chExt cx="13557600" cy="602079"/>
+            <a:chExt cx="13557600" cy="579600"/>
           </a:xfrm>
         </p:grpSpPr>
         <p:sp>
@@ -1286,10 +1310,12 @@
             </a:bodyPr>
             <a:lstStyle/>
             <a:p>
-              <a:endParaRPr lang="en-US" sz="2347">
+              <a:endParaRPr lang="en-US" sz="2400" b="0" u="none" strike="noStrike">
                 <a:solidFill>
                   <a:srgbClr val="000000"/>
                 </a:solidFill>
+                <a:effectLst/>
+                <a:uFillTx/>
                 <a:latin typeface="Times New Roman"/>
               </a:endParaRPr>
             </a:p>
@@ -1304,7 +1330,7 @@
           <p:spPr>
             <a:xfrm>
               <a:off x="29171880" y="8015760"/>
-              <a:ext cx="5956107" cy="310839"/>
+              <a:ext cx="5911920" cy="288360"/>
             </a:xfrm>
             <a:prstGeom prst="rect">
               <a:avLst/>
@@ -1321,29 +1347,35 @@
             <a:lstStyle/>
             <a:p>
               <a:r>
-                <a:rPr lang="en-US" sz="1975" b="1" dirty="0">
+                <a:rPr lang="en-US" sz="2020" b="1" u="none" strike="noStrike" dirty="0">
                   <a:solidFill>
                     <a:srgbClr val="565A5C"/>
                   </a:solidFill>
+                  <a:effectLst/>
+                  <a:uFillTx/>
                   <a:latin typeface="Arial"/>
                   <a:ea typeface="Arial"/>
                 </a:rPr>
                 <a:t>Acknowledgments: </a:t>
               </a:r>
               <a:r>
-                <a:rPr lang="en-US" sz="1975" dirty="0">
+                <a:rPr lang="en-US" sz="2020" b="0" u="none" strike="noStrike" dirty="0">
                   <a:solidFill>
                     <a:srgbClr val="565A5C"/>
                   </a:solidFill>
+                  <a:effectLst/>
+                  <a:uFillTx/>
                   <a:latin typeface="Arial"/>
                   <a:ea typeface="Arial"/>
                 </a:rPr>
                 <a:t>This work was supported by ...</a:t>
               </a:r>
-              <a:endParaRPr lang="en-US" sz="1975" dirty="0">
+              <a:endParaRPr lang="en-US" sz="2020" b="0" u="none" strike="noStrike" dirty="0">
                 <a:solidFill>
                   <a:srgbClr val="000000"/>
                 </a:solidFill>
+                <a:effectLst/>
+                <a:uFillTx/>
                 <a:latin typeface="Times New Roman"/>
               </a:endParaRPr>
             </a:p>
@@ -1366,8 +1398,8 @@
         </p:nvGrpSpPr>
         <p:grpSpPr>
           <a:xfrm>
-            <a:off x="0" y="741"/>
-            <a:ext cx="42450214" cy="3576296"/>
+            <a:off x="0" y="0"/>
+            <a:ext cx="43415280" cy="3657600"/>
             <a:chOff x="0" y="0"/>
             <a:chExt cx="43415280" cy="3657600"/>
           </a:xfrm>
@@ -1425,10 +1457,12 @@
             </a:bodyPr>
             <a:lstStyle/>
             <a:p>
-              <a:endParaRPr lang="en-US" sz="2347" dirty="0">
+              <a:endParaRPr lang="en-US" sz="2400" b="0" u="none" strike="noStrike" dirty="0">
                 <a:solidFill>
                   <a:srgbClr val="FFFFFF"/>
                 </a:solidFill>
+                <a:effectLst/>
+                <a:uFillTx/>
                 <a:latin typeface="Times New Roman"/>
               </a:endParaRPr>
             </a:p>
@@ -1487,10 +1521,12 @@
             </a:bodyPr>
             <a:lstStyle/>
             <a:p>
-              <a:endParaRPr lang="en-US" sz="2347">
+              <a:endParaRPr lang="en-US" sz="2400" b="0" u="none" strike="noStrike">
                 <a:solidFill>
                   <a:srgbClr val="000000"/>
                 </a:solidFill>
+                <a:effectLst/>
+                <a:uFillTx/>
                 <a:latin typeface="Times New Roman"/>
               </a:endParaRPr>
             </a:p>
@@ -1551,19 +1587,23 @@
             <a:p>
               <a:pPr algn="ctr"/>
               <a:r>
-                <a:rPr lang="en-US" sz="7040" b="1" dirty="0">
+                <a:rPr lang="en-US" sz="7200" b="1" u="none" strike="noStrike" dirty="0">
                   <a:solidFill>
                     <a:srgbClr val="FFFFFF"/>
                   </a:solidFill>
+                  <a:effectLst/>
+                  <a:uFillTx/>
                   <a:latin typeface="Arial"/>
                   <a:ea typeface="Arial"/>
                 </a:rPr>
                 <a:t>Your Poster Title Goes Here</a:t>
               </a:r>
-              <a:endParaRPr lang="en-US" sz="7040" dirty="0">
+              <a:endParaRPr lang="en-US" sz="7200" b="0" u="none" strike="noStrike" dirty="0">
                 <a:solidFill>
                   <a:srgbClr val="000000"/>
                 </a:solidFill>
+                <a:effectLst/>
+                <a:uFillTx/>
                 <a:latin typeface="Times New Roman"/>
               </a:endParaRPr>
             </a:p>
@@ -1598,59 +1638,71 @@
             <a:p>
               <a:pPr algn="ctr"/>
               <a:r>
-                <a:rPr lang="en-US" sz="3520" dirty="0">
+                <a:rPr lang="en-US" sz="3600" b="0" u="none" strike="noStrike" dirty="0">
                   <a:solidFill>
                     <a:srgbClr val="A2A4A3"/>
                   </a:solidFill>
+                  <a:effectLst/>
+                  <a:uFillTx/>
                   <a:latin typeface="Arial"/>
                   <a:ea typeface="Arial"/>
                 </a:rPr>
                 <a:t>Author One</a:t>
               </a:r>
               <a:r>
-                <a:rPr lang="en-US" sz="3520" baseline="30000" dirty="0">
+                <a:rPr lang="en-US" sz="3600" b="0" u="none" strike="noStrike" baseline="30000" dirty="0">
                   <a:solidFill>
                     <a:srgbClr val="A2A4A3"/>
                   </a:solidFill>
+                  <a:effectLst/>
+                  <a:uFillTx/>
                   <a:latin typeface="Arial"/>
                   <a:ea typeface="Arial"/>
                 </a:rPr>
                 <a:t>1</a:t>
               </a:r>
               <a:r>
-                <a:rPr lang="en-US" sz="3520" dirty="0">
+                <a:rPr lang="en-US" sz="3600" b="0" u="none" strike="noStrike" dirty="0">
                   <a:solidFill>
                     <a:srgbClr val="A2A4A3"/>
                   </a:solidFill>
+                  <a:effectLst/>
+                  <a:uFillTx/>
                   <a:latin typeface="Arial"/>
                   <a:ea typeface="Arial"/>
                 </a:rPr>
                 <a:t> , Author Two</a:t>
               </a:r>
               <a:r>
-                <a:rPr lang="en-US" sz="3520" baseline="30000" dirty="0">
+                <a:rPr lang="en-US" sz="3600" b="0" u="none" strike="noStrike" baseline="30000" dirty="0">
                   <a:solidFill>
                     <a:srgbClr val="A2A4A3"/>
                   </a:solidFill>
+                  <a:effectLst/>
+                  <a:uFillTx/>
                   <a:latin typeface="Arial"/>
                   <a:ea typeface="Arial"/>
                 </a:rPr>
                 <a:t>1,2</a:t>
               </a:r>
               <a:r>
-                <a:rPr lang="en-US" sz="3520" dirty="0">
+                <a:rPr lang="en-US" sz="3600" b="0" u="none" strike="noStrike" dirty="0">
                   <a:solidFill>
                     <a:srgbClr val="A2A4A3"/>
                   </a:solidFill>
+                  <a:effectLst/>
+                  <a:uFillTx/>
                   <a:latin typeface="Arial"/>
                   <a:ea typeface="Arial"/>
                 </a:rPr>
                 <a:t> </a:t>
               </a:r>
-              <a:endParaRPr lang="en-US" sz="3520" dirty="0">
+              <a:endParaRPr lang="en-US" sz="3600" b="0" u="none" strike="noStrike" dirty="0">
                 <a:solidFill>
                   <a:srgbClr val="000000"/>
                 </a:solidFill>
+                <a:effectLst/>
+                <a:uFillTx/>
                 <a:latin typeface="Times New Roman"/>
               </a:endParaRPr>
             </a:p>
@@ -1683,10 +1735,12 @@
             </a:bodyPr>
             <a:lstStyle/>
             <a:p>
-              <a:endParaRPr lang="en-US" sz="3520" dirty="0">
+              <a:endParaRPr lang="en-US" sz="3600" b="0" u="none" strike="noStrike" dirty="0">
                 <a:solidFill>
                   <a:srgbClr val="000000"/>
                 </a:solidFill>
+                <a:effectLst/>
+                <a:uFillTx/>
                 <a:latin typeface="Times New Roman"/>
               </a:endParaRPr>
             </a:p>
@@ -1721,27 +1775,31 @@
             <a:p>
               <a:pPr algn="ctr"/>
               <a:r>
-                <a:rPr lang="en-US" sz="2718" baseline="30000" dirty="0">
+                <a:rPr lang="en-US" sz="2780" b="0" u="none" strike="noStrike" baseline="30000" dirty="0">
                   <a:solidFill>
                     <a:srgbClr val="A2A4A3"/>
                   </a:solidFill>
+                  <a:effectLst/>
+                  <a:uFillTx/>
                   <a:latin typeface="Arial"/>
                   <a:ea typeface="Arial"/>
                 </a:rPr>
                 <a:t>1</a:t>
               </a:r>
               <a:r>
-                <a:rPr lang="en-US" sz="2718" dirty="0">
+                <a:rPr lang="en-US" sz="2780" b="0" u="none" strike="noStrike" dirty="0">
                   <a:solidFill>
                     <a:srgbClr val="A2A4A3"/>
                   </a:solidFill>
+                  <a:effectLst/>
+                  <a:uFillTx/>
                   <a:latin typeface="Arial"/>
                   <a:ea typeface="Arial"/>
                 </a:rPr>
                 <a:t>Department of Physics, University of Colorado Boulder</a:t>
               </a:r>
               <a:r>
-                <a:rPr lang="en-US" sz="2718" dirty="0">
+                <a:rPr lang="en-US" sz="2780" dirty="0">
                   <a:solidFill>
                     <a:srgbClr val="A2A4A3"/>
                   </a:solidFill>
@@ -1750,7 +1808,7 @@
                 <a:t>	</a:t>
               </a:r>
               <a:r>
-                <a:rPr lang="en-US" sz="2718" baseline="30000" dirty="0">
+                <a:rPr lang="en-US" sz="2780" baseline="30000" dirty="0">
                   <a:solidFill>
                     <a:srgbClr val="A2A4A3"/>
                   </a:solidFill>
@@ -1759,7 +1817,7 @@
                 <a:t>2</a:t>
               </a:r>
               <a:r>
-                <a:rPr lang="en-US" sz="2718" dirty="0">
+                <a:rPr lang="en-US" sz="2780" dirty="0">
                   <a:solidFill>
                     <a:srgbClr val="A2A4A3"/>
                   </a:solidFill>
@@ -1767,7 +1825,7 @@
                 </a:rPr>
                 <a:t>JILA, University of Colorado Boulder</a:t>
               </a:r>
-              <a:endParaRPr lang="en-US" sz="2718" dirty="0">
+              <a:endParaRPr lang="en-US" sz="2780" dirty="0">
                 <a:solidFill>
                   <a:srgbClr val="000000"/>
                 </a:solidFill>
@@ -1829,10 +1887,12 @@
             </a:bodyPr>
             <a:lstStyle/>
             <a:p>
-              <a:endParaRPr lang="en-US" sz="2718" dirty="0">
+              <a:endParaRPr lang="en-US" sz="2780" b="0" u="none" strike="noStrike" dirty="0">
                 <a:solidFill>
                   <a:srgbClr val="000000"/>
                 </a:solidFill>
+                <a:effectLst/>
+                <a:uFillTx/>
                 <a:latin typeface="Times New Roman"/>
               </a:endParaRPr>
             </a:p>
@@ -1865,10 +1925,12 @@
             </a:bodyPr>
             <a:lstStyle/>
             <a:p>
-              <a:endParaRPr lang="en-US" sz="2640" dirty="0">
+              <a:endParaRPr lang="en-US" sz="2700" b="0" u="none" strike="noStrike" dirty="0">
                 <a:solidFill>
                   <a:srgbClr val="000000"/>
                 </a:solidFill>
+                <a:effectLst/>
+                <a:uFillTx/>
                 <a:latin typeface="Times New Roman"/>
               </a:endParaRPr>
             </a:p>
@@ -1901,10 +1963,12 @@
             </a:bodyPr>
             <a:lstStyle/>
             <a:p>
-              <a:endParaRPr lang="en-US" sz="2640" dirty="0">
+              <a:endParaRPr lang="en-US" sz="2700" b="0" u="none" strike="noStrike" dirty="0">
                 <a:solidFill>
                   <a:srgbClr val="000000"/>
                 </a:solidFill>
+                <a:effectLst/>
+                <a:uFillTx/>
                 <a:latin typeface="Times New Roman"/>
               </a:endParaRPr>
             </a:p>
@@ -1937,10 +2001,12 @@
             </a:bodyPr>
             <a:lstStyle/>
             <a:p>
-              <a:endParaRPr lang="en-US" sz="2640" dirty="0">
+              <a:endParaRPr lang="en-US" sz="2700" b="0" u="none" strike="noStrike" dirty="0">
                 <a:solidFill>
                   <a:srgbClr val="000000"/>
                 </a:solidFill>
+                <a:effectLst/>
+                <a:uFillTx/>
                 <a:latin typeface="Times New Roman"/>
               </a:endParaRPr>
             </a:p>
@@ -1973,10 +2039,12 @@
             </a:bodyPr>
             <a:lstStyle/>
             <a:p>
-              <a:endParaRPr lang="en-US" sz="2034" dirty="0">
+              <a:endParaRPr lang="en-US" sz="2080" b="0" u="none" strike="noStrike" dirty="0">
                 <a:solidFill>
                   <a:srgbClr val="000000"/>
                 </a:solidFill>
+                <a:effectLst/>
+                <a:uFillTx/>
                 <a:latin typeface="Times New Roman"/>
               </a:endParaRPr>
             </a:p>
@@ -1999,8 +2067,8 @@
         </p:nvGrpSpPr>
         <p:grpSpPr>
           <a:xfrm>
-            <a:off x="0" y="30948727"/>
-            <a:ext cx="42450214" cy="890202"/>
+            <a:off x="0" y="31651560"/>
+            <a:ext cx="43415280" cy="910440"/>
             <a:chOff x="0" y="31651560"/>
             <a:chExt cx="43415280" cy="910440"/>
           </a:xfrm>
@@ -2058,10 +2126,12 @@
             </a:bodyPr>
             <a:lstStyle/>
             <a:p>
-              <a:endParaRPr lang="en-US" sz="2347">
+              <a:endParaRPr lang="en-US" sz="2400" b="0" u="none" strike="noStrike">
                 <a:solidFill>
                   <a:srgbClr val="FFFFFF"/>
                 </a:solidFill>
+                <a:effectLst/>
+                <a:uFillTx/>
                 <a:latin typeface="Times New Roman"/>
               </a:endParaRPr>
             </a:p>
@@ -2120,10 +2190,12 @@
             </a:bodyPr>
             <a:lstStyle/>
             <a:p>
-              <a:endParaRPr lang="en-US" sz="2347">
+              <a:endParaRPr lang="en-US" sz="2400" b="0" u="none" strike="noStrike">
                 <a:solidFill>
                   <a:srgbClr val="000000"/>
                 </a:solidFill>
+                <a:effectLst/>
+                <a:uFillTx/>
                 <a:latin typeface="Times New Roman"/>
               </a:endParaRPr>
             </a:p>
@@ -2157,19 +2229,23 @@
             <a:lstStyle/>
             <a:p>
               <a:r>
-                <a:rPr lang="en-US" sz="2053" dirty="0">
+                <a:rPr lang="en-US" sz="2100" b="0" u="none" strike="noStrike" dirty="0">
                   <a:solidFill>
                     <a:srgbClr val="A2A4A3"/>
                   </a:solidFill>
+                  <a:effectLst/>
+                  <a:uFillTx/>
                   <a:latin typeface="Arial"/>
                   <a:ea typeface="Arial"/>
                 </a:rPr>
                 <a:t>author@colorado.edu</a:t>
               </a:r>
-              <a:endParaRPr lang="en-US" sz="2053" dirty="0">
+              <a:endParaRPr lang="en-US" sz="2100" b="0" u="none" strike="noStrike" dirty="0">
                 <a:solidFill>
                   <a:srgbClr val="000000"/>
                 </a:solidFill>
+                <a:effectLst/>
+                <a:uFillTx/>
                 <a:latin typeface="Times New Roman"/>
               </a:endParaRPr>
             </a:p>
@@ -2204,19 +2280,23 @@
             <a:p>
               <a:pPr algn="ctr"/>
               <a:r>
-                <a:rPr lang="en-US" sz="2053" dirty="0">
+                <a:rPr lang="en-US" sz="2100" b="0" u="none" strike="noStrike" dirty="0">
                   <a:solidFill>
                     <a:srgbClr val="A2A4A3"/>
                   </a:solidFill>
+                  <a:effectLst/>
+                  <a:uFillTx/>
                   <a:latin typeface="Arial"/>
                   <a:ea typeface="Arial"/>
                 </a:rPr>
                 <a:t>ABC Conference 2026, City</a:t>
               </a:r>
-              <a:endParaRPr lang="en-US" sz="2053" dirty="0">
+              <a:endParaRPr lang="en-US" sz="2100" b="0" u="none" strike="noStrike" dirty="0">
                 <a:solidFill>
                   <a:srgbClr val="000000"/>
                 </a:solidFill>
+                <a:effectLst/>
+                <a:uFillTx/>
                 <a:latin typeface="Times New Roman"/>
               </a:endParaRPr>
             </a:p>
@@ -2251,19 +2331,23 @@
             <a:p>
               <a:pPr algn="r"/>
               <a:r>
-                <a:rPr lang="en-US" sz="2053" dirty="0">
+                <a:rPr lang="en-US" sz="2100" b="0" u="none" strike="noStrike" dirty="0">
                   <a:solidFill>
                     <a:srgbClr val="A2A4A3"/>
                   </a:solidFill>
+                  <a:effectLst/>
+                  <a:uFillTx/>
                   <a:latin typeface="Arial"/>
                   <a:ea typeface="Arial"/>
                 </a:rPr>
                 <a:t>https://www.colorado.edu</a:t>
               </a:r>
-              <a:endParaRPr lang="en-US" sz="2053" dirty="0">
+              <a:endParaRPr lang="en-US" sz="2100" b="0" u="none" strike="noStrike" dirty="0">
                 <a:solidFill>
                   <a:srgbClr val="000000"/>
                 </a:solidFill>
+                <a:effectLst/>
+                <a:uFillTx/>
                 <a:latin typeface="Times New Roman"/>
               </a:endParaRPr>
             </a:p>
@@ -2286,8 +2370,8 @@
         </p:nvGrpSpPr>
         <p:grpSpPr>
           <a:xfrm>
-            <a:off x="661404" y="4278569"/>
-            <a:ext cx="13262216" cy="779323"/>
+            <a:off x="676440" y="4375080"/>
+            <a:ext cx="13563720" cy="797040"/>
             <a:chOff x="14925600" y="4375080"/>
             <a:chExt cx="13563720" cy="797040"/>
           </a:xfrm>
@@ -2351,10 +2435,12 @@
             </a:bodyPr>
             <a:lstStyle/>
             <a:p>
-              <a:endParaRPr lang="en-US" sz="2347">
+              <a:endParaRPr lang="en-US" sz="2400" b="0" u="none" strike="noStrike">
                 <a:solidFill>
                   <a:srgbClr val="000000"/>
                 </a:solidFill>
+                <a:effectLst/>
+                <a:uFillTx/>
                 <a:latin typeface="Times New Roman"/>
               </a:endParaRPr>
             </a:p>
@@ -2394,19 +2480,23 @@
             <a:lstStyle/>
             <a:p>
               <a:r>
-                <a:rPr lang="en-US" sz="4107" b="1" dirty="0">
+                <a:rPr lang="en-US" sz="4200" b="1" u="none" strike="noStrike" dirty="0">
                   <a:solidFill>
                     <a:srgbClr val="000000"/>
                   </a:solidFill>
+                  <a:effectLst/>
+                  <a:uFillTx/>
                   <a:latin typeface="Arial"/>
                   <a:ea typeface="Arial"/>
                 </a:rPr>
                 <a:t>Column 1</a:t>
               </a:r>
-              <a:endParaRPr lang="en-US" sz="4107" dirty="0">
+              <a:endParaRPr lang="en-US" sz="4200" b="0" u="none" strike="noStrike" dirty="0">
                 <a:solidFill>
                   <a:srgbClr val="000000"/>
                 </a:solidFill>
+                <a:effectLst/>
+                <a:uFillTx/>
                 <a:latin typeface="Times New Roman"/>
               </a:endParaRPr>
             </a:p>

</xml_diff>